<commit_message>
Switch to AdamP optimizer and add warm restarts to training
</commit_message>
<xml_diff>
--- a/archive/triplet-loss-open-world/stn-presentation.pptx
+++ b/archive/triplet-loss-open-world/stn-presentation.pptx
@@ -10,6 +10,8 @@
     <p:sldId id="258" r:id="rId4"/>
     <p:sldId id="261" r:id="rId5"/>
     <p:sldId id="262" r:id="rId6"/>
+    <p:sldId id="263" r:id="rId7"/>
+    <p:sldId id="264" r:id="rId8"/>
   </p:sldIdLst>
   <p:sldSz cx="12192000" cy="6858000"/>
   <p:notesSz cx="6858000" cy="9144000"/>
@@ -108,6 +110,11 @@
       </a:defRPr>
     </a:lvl9pPr>
   </p:defaultTextStyle>
+  <p:extLst>
+    <p:ext uri="{EFAFB233-063F-42B5-8137-9DF3F51BA10A}">
+      <p15:sldGuideLst xmlns:p15="http://schemas.microsoft.com/office/powerpoint/2012/main"/>
+    </p:ext>
+  </p:extLst>
 </p:presentation>
 </file>
 
@@ -258,7 +265,7 @@
           <a:p>
             <a:fld id="{8402897A-896A-4154-87C8-C31DD00E0267}" type="datetimeFigureOut">
               <a:rPr lang="en-US" smtClean="0"/>
-              <a:t>4/14/2025</a:t>
+              <a:t>4/21/2025</a:t>
             </a:fld>
             <a:endParaRPr lang="en-US"/>
           </a:p>
@@ -456,7 +463,7 @@
           <a:p>
             <a:fld id="{8402897A-896A-4154-87C8-C31DD00E0267}" type="datetimeFigureOut">
               <a:rPr lang="en-US" smtClean="0"/>
-              <a:t>4/14/2025</a:t>
+              <a:t>4/21/2025</a:t>
             </a:fld>
             <a:endParaRPr lang="en-US"/>
           </a:p>
@@ -664,7 +671,7 @@
           <a:p>
             <a:fld id="{8402897A-896A-4154-87C8-C31DD00E0267}" type="datetimeFigureOut">
               <a:rPr lang="en-US" smtClean="0"/>
-              <a:t>4/14/2025</a:t>
+              <a:t>4/21/2025</a:t>
             </a:fld>
             <a:endParaRPr lang="en-US"/>
           </a:p>
@@ -862,7 +869,7 @@
           <a:p>
             <a:fld id="{8402897A-896A-4154-87C8-C31DD00E0267}" type="datetimeFigureOut">
               <a:rPr lang="en-US" smtClean="0"/>
-              <a:t>4/14/2025</a:t>
+              <a:t>4/21/2025</a:t>
             </a:fld>
             <a:endParaRPr lang="en-US"/>
           </a:p>
@@ -1137,7 +1144,7 @@
           <a:p>
             <a:fld id="{8402897A-896A-4154-87C8-C31DD00E0267}" type="datetimeFigureOut">
               <a:rPr lang="en-US" smtClean="0"/>
-              <a:t>4/14/2025</a:t>
+              <a:t>4/21/2025</a:t>
             </a:fld>
             <a:endParaRPr lang="en-US"/>
           </a:p>
@@ -1402,7 +1409,7 @@
           <a:p>
             <a:fld id="{8402897A-896A-4154-87C8-C31DD00E0267}" type="datetimeFigureOut">
               <a:rPr lang="en-US" smtClean="0"/>
-              <a:t>4/14/2025</a:t>
+              <a:t>4/21/2025</a:t>
             </a:fld>
             <a:endParaRPr lang="en-US"/>
           </a:p>
@@ -1814,7 +1821,7 @@
           <a:p>
             <a:fld id="{8402897A-896A-4154-87C8-C31DD00E0267}" type="datetimeFigureOut">
               <a:rPr lang="en-US" smtClean="0"/>
-              <a:t>4/14/2025</a:t>
+              <a:t>4/21/2025</a:t>
             </a:fld>
             <a:endParaRPr lang="en-US"/>
           </a:p>
@@ -1955,7 +1962,7 @@
           <a:p>
             <a:fld id="{8402897A-896A-4154-87C8-C31DD00E0267}" type="datetimeFigureOut">
               <a:rPr lang="en-US" smtClean="0"/>
-              <a:t>4/14/2025</a:t>
+              <a:t>4/21/2025</a:t>
             </a:fld>
             <a:endParaRPr lang="en-US"/>
           </a:p>
@@ -2068,7 +2075,7 @@
           <a:p>
             <a:fld id="{8402897A-896A-4154-87C8-C31DD00E0267}" type="datetimeFigureOut">
               <a:rPr lang="en-US" smtClean="0"/>
-              <a:t>4/14/2025</a:t>
+              <a:t>4/21/2025</a:t>
             </a:fld>
             <a:endParaRPr lang="en-US"/>
           </a:p>
@@ -2379,7 +2386,7 @@
           <a:p>
             <a:fld id="{8402897A-896A-4154-87C8-C31DD00E0267}" type="datetimeFigureOut">
               <a:rPr lang="en-US" smtClean="0"/>
-              <a:t>4/14/2025</a:t>
+              <a:t>4/21/2025</a:t>
             </a:fld>
             <a:endParaRPr lang="en-US"/>
           </a:p>
@@ -2667,7 +2674,7 @@
           <a:p>
             <a:fld id="{8402897A-896A-4154-87C8-C31DD00E0267}" type="datetimeFigureOut">
               <a:rPr lang="en-US" smtClean="0"/>
-              <a:t>4/14/2025</a:t>
+              <a:t>4/21/2025</a:t>
             </a:fld>
             <a:endParaRPr lang="en-US"/>
           </a:p>
@@ -2908,7 +2915,7 @@
           <a:p>
             <a:fld id="{8402897A-896A-4154-87C8-C31DD00E0267}" type="datetimeFigureOut">
               <a:rPr lang="en-US" smtClean="0"/>
-              <a:t>4/14/2025</a:t>
+              <a:t>4/21/2025</a:t>
             </a:fld>
             <a:endParaRPr lang="en-US"/>
           </a:p>
@@ -3601,42 +3608,6 @@
           </a:p>
         </p:txBody>
       </p:sp>
-      <p:pic>
-        <p:nvPicPr>
-          <p:cNvPr id="7" name="Picture 6" descr="A graph with lines and numbers&#10;&#10;AI-generated content may be incorrect.">
-            <a:extLst>
-              <a:ext uri="{FF2B5EF4-FFF2-40B4-BE49-F238E27FC236}">
-                <a16:creationId xmlns:a16="http://schemas.microsoft.com/office/drawing/2014/main" id="{475A121F-2269-78C6-073B-5A24B8B0EFD2}"/>
-              </a:ext>
-            </a:extLst>
-          </p:cNvPr>
-          <p:cNvPicPr>
-            <a:picLocks noChangeAspect="1"/>
-          </p:cNvPicPr>
-          <p:nvPr/>
-        </p:nvPicPr>
-        <p:blipFill>
-          <a:blip r:embed="rId2">
-            <a:extLst>
-              <a:ext uri="{28A0092B-C50C-407E-A947-70E740481C1C}">
-                <a14:useLocalDpi xmlns:a14="http://schemas.microsoft.com/office/drawing/2010/main" val="0"/>
-              </a:ext>
-            </a:extLst>
-          </a:blip>
-          <a:stretch>
-            <a:fillRect/>
-          </a:stretch>
-        </p:blipFill>
-        <p:spPr>
-          <a:xfrm>
-            <a:off x="518149" y="1714496"/>
-            <a:ext cx="5577851" cy="4114808"/>
-          </a:xfrm>
-          <a:prstGeom prst="rect">
-            <a:avLst/>
-          </a:prstGeom>
-        </p:spPr>
-      </p:pic>
       <p:sp>
         <p:nvSpPr>
           <p:cNvPr id="8" name="TextBox 7">
@@ -3674,42 +3645,6 @@
           </a:p>
         </p:txBody>
       </p:sp>
-      <p:pic>
-        <p:nvPicPr>
-          <p:cNvPr id="10" name="Picture 9" descr="A graph of a line graph&#10;&#10;AI-generated content may be incorrect.">
-            <a:extLst>
-              <a:ext uri="{FF2B5EF4-FFF2-40B4-BE49-F238E27FC236}">
-                <a16:creationId xmlns:a16="http://schemas.microsoft.com/office/drawing/2014/main" id="{4D742C45-6F38-6580-B1EC-736192AD1D0A}"/>
-              </a:ext>
-            </a:extLst>
-          </p:cNvPr>
-          <p:cNvPicPr>
-            <a:picLocks noChangeAspect="1"/>
-          </p:cNvPicPr>
-          <p:nvPr/>
-        </p:nvPicPr>
-        <p:blipFill>
-          <a:blip r:embed="rId3">
-            <a:extLst>
-              <a:ext uri="{28A0092B-C50C-407E-A947-70E740481C1C}">
-                <a14:useLocalDpi xmlns:a14="http://schemas.microsoft.com/office/drawing/2010/main" val="0"/>
-              </a:ext>
-            </a:extLst>
-          </a:blip>
-          <a:stretch>
-            <a:fillRect/>
-          </a:stretch>
-        </p:blipFill>
-        <p:spPr>
-          <a:xfrm>
-            <a:off x="6096000" y="1714496"/>
-            <a:ext cx="5577851" cy="4114808"/>
-          </a:xfrm>
-          <a:prstGeom prst="rect">
-            <a:avLst/>
-          </a:prstGeom>
-        </p:spPr>
-      </p:pic>
       <p:sp>
         <p:nvSpPr>
           <p:cNvPr id="11" name="TextBox 10">
@@ -3751,6 +3686,78 @@
           </a:p>
         </p:txBody>
       </p:sp>
+      <p:pic>
+        <p:nvPicPr>
+          <p:cNvPr id="12" name="Picture 11" descr="A graph with a line and numbers&#10;&#10;AI-generated content may be incorrect.">
+            <a:extLst>
+              <a:ext uri="{FF2B5EF4-FFF2-40B4-BE49-F238E27FC236}">
+                <a16:creationId xmlns:a16="http://schemas.microsoft.com/office/drawing/2014/main" id="{D4EE118C-8C5C-C4A6-A899-EC9485380BDE}"/>
+              </a:ext>
+            </a:extLst>
+          </p:cNvPr>
+          <p:cNvPicPr>
+            <a:picLocks noChangeAspect="1"/>
+          </p:cNvPicPr>
+          <p:nvPr/>
+        </p:nvPicPr>
+        <p:blipFill>
+          <a:blip r:embed="rId2">
+            <a:extLst>
+              <a:ext uri="{28A0092B-C50C-407E-A947-70E740481C1C}">
+                <a14:useLocalDpi xmlns:a14="http://schemas.microsoft.com/office/drawing/2010/main" val="0"/>
+              </a:ext>
+            </a:extLst>
+          </a:blip>
+          <a:stretch>
+            <a:fillRect/>
+          </a:stretch>
+        </p:blipFill>
+        <p:spPr>
+          <a:xfrm>
+            <a:off x="515100" y="1714496"/>
+            <a:ext cx="5580899" cy="4114808"/>
+          </a:xfrm>
+          <a:prstGeom prst="rect">
+            <a:avLst/>
+          </a:prstGeom>
+        </p:spPr>
+      </p:pic>
+      <p:pic>
+        <p:nvPicPr>
+          <p:cNvPr id="14" name="Picture 13" descr="A graph of a person's angle&#10;&#10;AI-generated content may be incorrect.">
+            <a:extLst>
+              <a:ext uri="{FF2B5EF4-FFF2-40B4-BE49-F238E27FC236}">
+                <a16:creationId xmlns:a16="http://schemas.microsoft.com/office/drawing/2014/main" id="{861891BC-C8D1-ED1F-F802-756C6F00D21C}"/>
+              </a:ext>
+            </a:extLst>
+          </p:cNvPr>
+          <p:cNvPicPr>
+            <a:picLocks noChangeAspect="1"/>
+          </p:cNvPicPr>
+          <p:nvPr/>
+        </p:nvPicPr>
+        <p:blipFill>
+          <a:blip r:embed="rId3">
+            <a:extLst>
+              <a:ext uri="{28A0092B-C50C-407E-A947-70E740481C1C}">
+                <a14:useLocalDpi xmlns:a14="http://schemas.microsoft.com/office/drawing/2010/main" val="0"/>
+              </a:ext>
+            </a:extLst>
+          </a:blip>
+          <a:stretch>
+            <a:fillRect/>
+          </a:stretch>
+        </p:blipFill>
+        <p:spPr>
+          <a:xfrm>
+            <a:off x="6094474" y="1717008"/>
+            <a:ext cx="5580899" cy="4114808"/>
+          </a:xfrm>
+          <a:prstGeom prst="rect">
+            <a:avLst/>
+          </a:prstGeom>
+        </p:spPr>
+      </p:pic>
     </p:spTree>
     <p:extLst>
       <p:ext uri="{BB962C8B-B14F-4D97-AF65-F5344CB8AC3E}">
@@ -3787,42 +3794,6 @@
           <a:chExt cx="0" cy="0"/>
         </a:xfrm>
       </p:grpSpPr>
-      <p:pic>
-        <p:nvPicPr>
-          <p:cNvPr id="4" name="Picture 3" descr="A graph of a line graph&#10;&#10;AI-generated content may be incorrect.">
-            <a:extLst>
-              <a:ext uri="{FF2B5EF4-FFF2-40B4-BE49-F238E27FC236}">
-                <a16:creationId xmlns:a16="http://schemas.microsoft.com/office/drawing/2014/main" id="{90350BD1-B058-4413-03B7-E57F78DF9314}"/>
-              </a:ext>
-            </a:extLst>
-          </p:cNvPr>
-          <p:cNvPicPr>
-            <a:picLocks noChangeAspect="1"/>
-          </p:cNvPicPr>
-          <p:nvPr/>
-        </p:nvPicPr>
-        <p:blipFill>
-          <a:blip r:embed="rId2">
-            <a:extLst>
-              <a:ext uri="{28A0092B-C50C-407E-A947-70E740481C1C}">
-                <a14:useLocalDpi xmlns:a14="http://schemas.microsoft.com/office/drawing/2010/main" val="0"/>
-              </a:ext>
-            </a:extLst>
-          </a:blip>
-          <a:stretch>
-            <a:fillRect/>
-          </a:stretch>
-        </p:blipFill>
-        <p:spPr>
-          <a:xfrm>
-            <a:off x="518147" y="1720832"/>
-            <a:ext cx="5577851" cy="4114808"/>
-          </a:xfrm>
-          <a:prstGeom prst="rect">
-            <a:avLst/>
-          </a:prstGeom>
-        </p:spPr>
-      </p:pic>
       <p:sp>
         <p:nvSpPr>
           <p:cNvPr id="2" name="Title 1">
@@ -3888,42 +3859,6 @@
           </a:p>
         </p:txBody>
       </p:sp>
-      <p:pic>
-        <p:nvPicPr>
-          <p:cNvPr id="6" name="Picture 5" descr="A graph of different angles&#10;&#10;AI-generated content may be incorrect.">
-            <a:extLst>
-              <a:ext uri="{FF2B5EF4-FFF2-40B4-BE49-F238E27FC236}">
-                <a16:creationId xmlns:a16="http://schemas.microsoft.com/office/drawing/2014/main" id="{0279924D-1A80-1457-4496-7A914777D72A}"/>
-              </a:ext>
-            </a:extLst>
-          </p:cNvPr>
-          <p:cNvPicPr>
-            <a:picLocks noChangeAspect="1"/>
-          </p:cNvPicPr>
-          <p:nvPr/>
-        </p:nvPicPr>
-        <p:blipFill>
-          <a:blip r:embed="rId3">
-            <a:extLst>
-              <a:ext uri="{28A0092B-C50C-407E-A947-70E740481C1C}">
-                <a14:useLocalDpi xmlns:a14="http://schemas.microsoft.com/office/drawing/2010/main" val="0"/>
-              </a:ext>
-            </a:extLst>
-          </a:blip>
-          <a:stretch>
-            <a:fillRect/>
-          </a:stretch>
-        </p:blipFill>
-        <p:spPr>
-          <a:xfrm>
-            <a:off x="6095998" y="1720832"/>
-            <a:ext cx="5577851" cy="4114808"/>
-          </a:xfrm>
-          <a:prstGeom prst="rect">
-            <a:avLst/>
-          </a:prstGeom>
-        </p:spPr>
-      </p:pic>
       <p:sp>
         <p:nvSpPr>
           <p:cNvPr id="9" name="TextBox 8">
@@ -3965,6 +3900,78 @@
           </a:p>
         </p:txBody>
       </p:sp>
+      <p:pic>
+        <p:nvPicPr>
+          <p:cNvPr id="10" name="Picture 9" descr="A graph of different angles&#10;&#10;AI-generated content may be incorrect.">
+            <a:extLst>
+              <a:ext uri="{FF2B5EF4-FFF2-40B4-BE49-F238E27FC236}">
+                <a16:creationId xmlns:a16="http://schemas.microsoft.com/office/drawing/2014/main" id="{29AE91C3-27C2-5A83-5D83-51B2D4920DD6}"/>
+              </a:ext>
+            </a:extLst>
+          </p:cNvPr>
+          <p:cNvPicPr>
+            <a:picLocks noChangeAspect="1"/>
+          </p:cNvPicPr>
+          <p:nvPr/>
+        </p:nvPicPr>
+        <p:blipFill>
+          <a:blip r:embed="rId2">
+            <a:extLst>
+              <a:ext uri="{28A0092B-C50C-407E-A947-70E740481C1C}">
+                <a14:useLocalDpi xmlns:a14="http://schemas.microsoft.com/office/drawing/2010/main" val="0"/>
+              </a:ext>
+            </a:extLst>
+          </a:blip>
+          <a:stretch>
+            <a:fillRect/>
+          </a:stretch>
+        </p:blipFill>
+        <p:spPr>
+          <a:xfrm>
+            <a:off x="518151" y="1720832"/>
+            <a:ext cx="5580899" cy="4114808"/>
+          </a:xfrm>
+          <a:prstGeom prst="rect">
+            <a:avLst/>
+          </a:prstGeom>
+        </p:spPr>
+      </p:pic>
+      <p:pic>
+        <p:nvPicPr>
+          <p:cNvPr id="12" name="Picture 11" descr="A graph of different angles&#10;&#10;AI-generated content may be incorrect.">
+            <a:extLst>
+              <a:ext uri="{FF2B5EF4-FFF2-40B4-BE49-F238E27FC236}">
+                <a16:creationId xmlns:a16="http://schemas.microsoft.com/office/drawing/2014/main" id="{E6DC50D4-56A3-4A37-5194-B634ED14443B}"/>
+              </a:ext>
+            </a:extLst>
+          </p:cNvPr>
+          <p:cNvPicPr>
+            <a:picLocks noChangeAspect="1"/>
+          </p:cNvPicPr>
+          <p:nvPr/>
+        </p:nvPicPr>
+        <p:blipFill>
+          <a:blip r:embed="rId3">
+            <a:extLst>
+              <a:ext uri="{28A0092B-C50C-407E-A947-70E740481C1C}">
+                <a14:useLocalDpi xmlns:a14="http://schemas.microsoft.com/office/drawing/2010/main" val="0"/>
+              </a:ext>
+            </a:extLst>
+          </a:blip>
+          <a:stretch>
+            <a:fillRect/>
+          </a:stretch>
+        </p:blipFill>
+        <p:spPr>
+          <a:xfrm>
+            <a:off x="6096000" y="1799903"/>
+            <a:ext cx="5580899" cy="4114808"/>
+          </a:xfrm>
+          <a:prstGeom prst="rect">
+            <a:avLst/>
+          </a:prstGeom>
+        </p:spPr>
+      </p:pic>
     </p:spTree>
     <p:extLst>
       <p:ext uri="{BB962C8B-B14F-4D97-AF65-F5344CB8AC3E}">
@@ -4001,42 +4008,6 @@
           <a:chExt cx="0" cy="0"/>
         </a:xfrm>
       </p:grpSpPr>
-      <p:pic>
-        <p:nvPicPr>
-          <p:cNvPr id="4" name="Picture 3" descr="A group of colorful dots&#10;&#10;AI-generated content may be incorrect.">
-            <a:extLst>
-              <a:ext uri="{FF2B5EF4-FFF2-40B4-BE49-F238E27FC236}">
-                <a16:creationId xmlns:a16="http://schemas.microsoft.com/office/drawing/2014/main" id="{8CFEF658-66BC-9307-5125-C39213603D3C}"/>
-              </a:ext>
-            </a:extLst>
-          </p:cNvPr>
-          <p:cNvPicPr>
-            <a:picLocks noChangeAspect="1"/>
-          </p:cNvPicPr>
-          <p:nvPr/>
-        </p:nvPicPr>
-        <p:blipFill>
-          <a:blip r:embed="rId2">
-            <a:extLst>
-              <a:ext uri="{28A0092B-C50C-407E-A947-70E740481C1C}">
-                <a14:useLocalDpi xmlns:a14="http://schemas.microsoft.com/office/drawing/2010/main" val="0"/>
-              </a:ext>
-            </a:extLst>
-          </a:blip>
-          <a:stretch>
-            <a:fillRect/>
-          </a:stretch>
-        </p:blipFill>
-        <p:spPr>
-          <a:xfrm>
-            <a:off x="518149" y="1714496"/>
-            <a:ext cx="5577851" cy="4114808"/>
-          </a:xfrm>
-          <a:prstGeom prst="rect">
-            <a:avLst/>
-          </a:prstGeom>
-        </p:spPr>
-      </p:pic>
       <p:sp>
         <p:nvSpPr>
           <p:cNvPr id="2" name="Title 1">
@@ -4102,42 +4073,6 @@
           </a:p>
         </p:txBody>
       </p:sp>
-      <p:pic>
-        <p:nvPicPr>
-          <p:cNvPr id="6" name="Picture 5" descr="A group of colorful dots&#10;&#10;AI-generated content may be incorrect.">
-            <a:extLst>
-              <a:ext uri="{FF2B5EF4-FFF2-40B4-BE49-F238E27FC236}">
-                <a16:creationId xmlns:a16="http://schemas.microsoft.com/office/drawing/2014/main" id="{44F57CF7-3996-2EB0-D458-9014DC3B4D7E}"/>
-              </a:ext>
-            </a:extLst>
-          </p:cNvPr>
-          <p:cNvPicPr>
-            <a:picLocks noChangeAspect="1"/>
-          </p:cNvPicPr>
-          <p:nvPr/>
-        </p:nvPicPr>
-        <p:blipFill>
-          <a:blip r:embed="rId3">
-            <a:extLst>
-              <a:ext uri="{28A0092B-C50C-407E-A947-70E740481C1C}">
-                <a14:useLocalDpi xmlns:a14="http://schemas.microsoft.com/office/drawing/2010/main" val="0"/>
-              </a:ext>
-            </a:extLst>
-          </a:blip>
-          <a:stretch>
-            <a:fillRect/>
-          </a:stretch>
-        </p:blipFill>
-        <p:spPr>
-          <a:xfrm>
-            <a:off x="6096000" y="1714496"/>
-            <a:ext cx="5577851" cy="4114808"/>
-          </a:xfrm>
-          <a:prstGeom prst="rect">
-            <a:avLst/>
-          </a:prstGeom>
-        </p:spPr>
-      </p:pic>
       <p:sp>
         <p:nvSpPr>
           <p:cNvPr id="9" name="TextBox 8">
@@ -4179,10 +4114,504 @@
           </a:p>
         </p:txBody>
       </p:sp>
+      <p:pic>
+        <p:nvPicPr>
+          <p:cNvPr id="5" name="Picture 4" descr="A group of colorful shapes&#10;&#10;AI-generated content may be incorrect.">
+            <a:extLst>
+              <a:ext uri="{FF2B5EF4-FFF2-40B4-BE49-F238E27FC236}">
+                <a16:creationId xmlns:a16="http://schemas.microsoft.com/office/drawing/2014/main" id="{C78969BB-5A53-C00C-677B-C1712D176E58}"/>
+              </a:ext>
+            </a:extLst>
+          </p:cNvPr>
+          <p:cNvPicPr>
+            <a:picLocks noChangeAspect="1"/>
+          </p:cNvPicPr>
+          <p:nvPr/>
+        </p:nvPicPr>
+        <p:blipFill>
+          <a:blip r:embed="rId2">
+            <a:extLst>
+              <a:ext uri="{28A0092B-C50C-407E-A947-70E740481C1C}">
+                <a14:useLocalDpi xmlns:a14="http://schemas.microsoft.com/office/drawing/2010/main" val="0"/>
+              </a:ext>
+            </a:extLst>
+          </a:blip>
+          <a:stretch>
+            <a:fillRect/>
+          </a:stretch>
+        </p:blipFill>
+        <p:spPr>
+          <a:xfrm>
+            <a:off x="488003" y="1714496"/>
+            <a:ext cx="5577851" cy="4114808"/>
+          </a:xfrm>
+          <a:prstGeom prst="rect">
+            <a:avLst/>
+          </a:prstGeom>
+        </p:spPr>
+      </p:pic>
+      <p:pic>
+        <p:nvPicPr>
+          <p:cNvPr id="10" name="Picture 9" descr="A group of colorful dots&#10;&#10;AI-generated content may be incorrect.">
+            <a:extLst>
+              <a:ext uri="{FF2B5EF4-FFF2-40B4-BE49-F238E27FC236}">
+                <a16:creationId xmlns:a16="http://schemas.microsoft.com/office/drawing/2014/main" id="{5FEE4169-AA07-01F8-FF3C-48DCD11828B7}"/>
+              </a:ext>
+            </a:extLst>
+          </p:cNvPr>
+          <p:cNvPicPr>
+            <a:picLocks noChangeAspect="1"/>
+          </p:cNvPicPr>
+          <p:nvPr/>
+        </p:nvPicPr>
+        <p:blipFill>
+          <a:blip r:embed="rId3">
+            <a:extLst>
+              <a:ext uri="{28A0092B-C50C-407E-A947-70E740481C1C}">
+                <a14:useLocalDpi xmlns:a14="http://schemas.microsoft.com/office/drawing/2010/main" val="0"/>
+              </a:ext>
+            </a:extLst>
+          </a:blip>
+          <a:stretch>
+            <a:fillRect/>
+          </a:stretch>
+        </p:blipFill>
+        <p:spPr>
+          <a:xfrm>
+            <a:off x="6126146" y="1714496"/>
+            <a:ext cx="5577851" cy="4114808"/>
+          </a:xfrm>
+          <a:prstGeom prst="rect">
+            <a:avLst/>
+          </a:prstGeom>
+        </p:spPr>
+      </p:pic>
     </p:spTree>
     <p:extLst>
       <p:ext uri="{BB962C8B-B14F-4D97-AF65-F5344CB8AC3E}">
         <p14:creationId xmlns:p14="http://schemas.microsoft.com/office/powerpoint/2010/main" val="2130945592"/>
+      </p:ext>
+    </p:extLst>
+  </p:cSld>
+  <p:clrMapOvr>
+    <a:masterClrMapping/>
+  </p:clrMapOvr>
+</p:sld>
+</file>
+
+<file path=ppt/slides/slide6.xml><?xml version="1.0" encoding="utf-8"?>
+<p:sld xmlns:a="http://schemas.openxmlformats.org/drawingml/2006/main" xmlns:r="http://schemas.openxmlformats.org/officeDocument/2006/relationships" xmlns:p="http://schemas.openxmlformats.org/presentationml/2006/main">
+  <p:cSld>
+    <p:spTree>
+      <p:nvGrpSpPr>
+        <p:cNvPr id="1" name=""/>
+        <p:cNvGrpSpPr/>
+        <p:nvPr/>
+      </p:nvGrpSpPr>
+      <p:grpSpPr>
+        <a:xfrm>
+          <a:off x="0" y="0"/>
+          <a:ext cx="0" cy="0"/>
+          <a:chOff x="0" y="0"/>
+          <a:chExt cx="0" cy="0"/>
+        </a:xfrm>
+      </p:grpSpPr>
+      <p:sp>
+        <p:nvSpPr>
+          <p:cNvPr id="2" name="Title 1">
+            <a:extLst>
+              <a:ext uri="{FF2B5EF4-FFF2-40B4-BE49-F238E27FC236}">
+                <a16:creationId xmlns:a16="http://schemas.microsoft.com/office/drawing/2014/main" id="{814D859F-C5A7-11BE-B225-5B86A872E381}"/>
+              </a:ext>
+            </a:extLst>
+          </p:cNvPr>
+          <p:cNvSpPr>
+            <a:spLocks noGrp="1"/>
+          </p:cNvSpPr>
+          <p:nvPr>
+            <p:ph type="title"/>
+          </p:nvPr>
+        </p:nvSpPr>
+        <p:spPr/>
+        <p:txBody>
+          <a:bodyPr/>
+          <a:lstStyle/>
+          <a:p>
+            <a:r>
+              <a:rPr lang="en-US" dirty="0" err="1"/>
+              <a:t>ConvNeXt</a:t>
+            </a:r>
+            <a:r>
+              <a:rPr lang="en-US" dirty="0"/>
+              <a:t> Histograms</a:t>
+            </a:r>
+          </a:p>
+        </p:txBody>
+      </p:sp>
+      <p:sp>
+        <p:nvSpPr>
+          <p:cNvPr id="4" name="TextBox 3">
+            <a:extLst>
+              <a:ext uri="{FF2B5EF4-FFF2-40B4-BE49-F238E27FC236}">
+                <a16:creationId xmlns:a16="http://schemas.microsoft.com/office/drawing/2014/main" id="{7AB3C599-A9CD-82B1-80A0-0406CD046387}"/>
+              </a:ext>
+            </a:extLst>
+          </p:cNvPr>
+          <p:cNvSpPr txBox="1"/>
+          <p:nvPr/>
+        </p:nvSpPr>
+        <p:spPr>
+          <a:xfrm>
+            <a:off x="1412959" y="5914711"/>
+            <a:ext cx="3788229" cy="369332"/>
+          </a:xfrm>
+          <a:prstGeom prst="rect">
+            <a:avLst/>
+          </a:prstGeom>
+          <a:noFill/>
+        </p:spPr>
+        <p:txBody>
+          <a:bodyPr wrap="square" rtlCol="0">
+            <a:spAutoFit/>
+          </a:bodyPr>
+          <a:lstStyle/>
+          <a:p>
+            <a:pPr algn="ctr"/>
+            <a:r>
+              <a:rPr lang="en-US" dirty="0"/>
+              <a:t>0 vs 0</a:t>
+            </a:r>
+          </a:p>
+        </p:txBody>
+      </p:sp>
+      <p:sp>
+        <p:nvSpPr>
+          <p:cNvPr id="6" name="TextBox 5">
+            <a:extLst>
+              <a:ext uri="{FF2B5EF4-FFF2-40B4-BE49-F238E27FC236}">
+                <a16:creationId xmlns:a16="http://schemas.microsoft.com/office/drawing/2014/main" id="{21ECD4AB-7503-304B-D4A4-3ADD0A9F0269}"/>
+              </a:ext>
+            </a:extLst>
+          </p:cNvPr>
+          <p:cNvSpPr txBox="1"/>
+          <p:nvPr/>
+        </p:nvSpPr>
+        <p:spPr>
+          <a:xfrm>
+            <a:off x="6990814" y="5914711"/>
+            <a:ext cx="3788229" cy="369332"/>
+          </a:xfrm>
+          <a:prstGeom prst="rect">
+            <a:avLst/>
+          </a:prstGeom>
+          <a:noFill/>
+        </p:spPr>
+        <p:txBody>
+          <a:bodyPr wrap="square" rtlCol="0">
+            <a:spAutoFit/>
+          </a:bodyPr>
+          <a:lstStyle/>
+          <a:p>
+            <a:pPr algn="ctr"/>
+            <a:r>
+              <a:rPr lang="en-US" dirty="0"/>
+              <a:t>50 vs 0</a:t>
+            </a:r>
+          </a:p>
+        </p:txBody>
+      </p:sp>
+      <p:pic>
+        <p:nvPicPr>
+          <p:cNvPr id="9" name="Picture 8" descr="A graph of a graph of a distance&#10;&#10;AI-generated content may be incorrect.">
+            <a:extLst>
+              <a:ext uri="{FF2B5EF4-FFF2-40B4-BE49-F238E27FC236}">
+                <a16:creationId xmlns:a16="http://schemas.microsoft.com/office/drawing/2014/main" id="{0C735B14-2B94-72C2-58AA-54C57C6FF0D2}"/>
+              </a:ext>
+            </a:extLst>
+          </p:cNvPr>
+          <p:cNvPicPr>
+            <a:picLocks noChangeAspect="1"/>
+          </p:cNvPicPr>
+          <p:nvPr/>
+        </p:nvPicPr>
+        <p:blipFill>
+          <a:blip r:embed="rId2">
+            <a:extLst>
+              <a:ext uri="{28A0092B-C50C-407E-A947-70E740481C1C}">
+                <a14:useLocalDpi xmlns:a14="http://schemas.microsoft.com/office/drawing/2010/main" val="0"/>
+              </a:ext>
+            </a:extLst>
+          </a:blip>
+          <a:stretch>
+            <a:fillRect/>
+          </a:stretch>
+        </p:blipFill>
+        <p:spPr>
+          <a:xfrm>
+            <a:off x="518147" y="1714496"/>
+            <a:ext cx="5577851" cy="4114808"/>
+          </a:xfrm>
+          <a:prstGeom prst="rect">
+            <a:avLst/>
+          </a:prstGeom>
+        </p:spPr>
+      </p:pic>
+      <p:pic>
+        <p:nvPicPr>
+          <p:cNvPr id="11" name="Picture 10" descr="A graph of a number of people&#10;&#10;AI-generated content may be incorrect.">
+            <a:extLst>
+              <a:ext uri="{FF2B5EF4-FFF2-40B4-BE49-F238E27FC236}">
+                <a16:creationId xmlns:a16="http://schemas.microsoft.com/office/drawing/2014/main" id="{5CB7AF52-B376-5AA4-2822-33DB51350E61}"/>
+              </a:ext>
+            </a:extLst>
+          </p:cNvPr>
+          <p:cNvPicPr>
+            <a:picLocks noChangeAspect="1"/>
+          </p:cNvPicPr>
+          <p:nvPr/>
+        </p:nvPicPr>
+        <p:blipFill>
+          <a:blip r:embed="rId3">
+            <a:extLst>
+              <a:ext uri="{28A0092B-C50C-407E-A947-70E740481C1C}">
+                <a14:useLocalDpi xmlns:a14="http://schemas.microsoft.com/office/drawing/2010/main" val="0"/>
+              </a:ext>
+            </a:extLst>
+          </a:blip>
+          <a:stretch>
+            <a:fillRect/>
+          </a:stretch>
+        </p:blipFill>
+        <p:spPr>
+          <a:xfrm>
+            <a:off x="6095998" y="1714496"/>
+            <a:ext cx="5577851" cy="4114808"/>
+          </a:xfrm>
+          <a:prstGeom prst="rect">
+            <a:avLst/>
+          </a:prstGeom>
+        </p:spPr>
+      </p:pic>
+    </p:spTree>
+    <p:extLst>
+      <p:ext uri="{BB962C8B-B14F-4D97-AF65-F5344CB8AC3E}">
+        <p14:creationId xmlns:p14="http://schemas.microsoft.com/office/powerpoint/2010/main" val="143089429"/>
+      </p:ext>
+    </p:extLst>
+  </p:cSld>
+  <p:clrMapOvr>
+    <a:masterClrMapping/>
+  </p:clrMapOvr>
+</p:sld>
+</file>
+
+<file path=ppt/slides/slide7.xml><?xml version="1.0" encoding="utf-8"?>
+<p:sld xmlns:a="http://schemas.openxmlformats.org/drawingml/2006/main" xmlns:r="http://schemas.openxmlformats.org/officeDocument/2006/relationships" xmlns:p="http://schemas.openxmlformats.org/presentationml/2006/main">
+  <p:cSld>
+    <p:spTree>
+      <p:nvGrpSpPr>
+        <p:cNvPr id="1" name="">
+          <a:extLst>
+            <a:ext uri="{FF2B5EF4-FFF2-40B4-BE49-F238E27FC236}">
+              <a16:creationId xmlns:a16="http://schemas.microsoft.com/office/drawing/2014/main" id="{16F2C440-A687-39A9-0777-A51A279ECA2D}"/>
+            </a:ext>
+          </a:extLst>
+        </p:cNvPr>
+        <p:cNvGrpSpPr/>
+        <p:nvPr/>
+      </p:nvGrpSpPr>
+      <p:grpSpPr>
+        <a:xfrm>
+          <a:off x="0" y="0"/>
+          <a:ext cx="0" cy="0"/>
+          <a:chOff x="0" y="0"/>
+          <a:chExt cx="0" cy="0"/>
+        </a:xfrm>
+      </p:grpSpPr>
+      <p:sp>
+        <p:nvSpPr>
+          <p:cNvPr id="2" name="Title 1">
+            <a:extLst>
+              <a:ext uri="{FF2B5EF4-FFF2-40B4-BE49-F238E27FC236}">
+                <a16:creationId xmlns:a16="http://schemas.microsoft.com/office/drawing/2014/main" id="{6B4F4DCC-2CCC-115C-0A6D-5FF4FC743491}"/>
+              </a:ext>
+            </a:extLst>
+          </p:cNvPr>
+          <p:cNvSpPr>
+            <a:spLocks noGrp="1"/>
+          </p:cNvSpPr>
+          <p:nvPr>
+            <p:ph type="title"/>
+          </p:nvPr>
+        </p:nvSpPr>
+        <p:spPr/>
+        <p:txBody>
+          <a:bodyPr/>
+          <a:lstStyle/>
+          <a:p>
+            <a:r>
+              <a:rPr lang="en-US" dirty="0"/>
+              <a:t>STN + </a:t>
+            </a:r>
+            <a:r>
+              <a:rPr lang="en-US" dirty="0" err="1"/>
+              <a:t>ConvNeXt</a:t>
+            </a:r>
+            <a:r>
+              <a:rPr lang="en-US" dirty="0"/>
+              <a:t> Histograms</a:t>
+            </a:r>
+          </a:p>
+        </p:txBody>
+      </p:sp>
+      <p:sp>
+        <p:nvSpPr>
+          <p:cNvPr id="4" name="TextBox 3">
+            <a:extLst>
+              <a:ext uri="{FF2B5EF4-FFF2-40B4-BE49-F238E27FC236}">
+                <a16:creationId xmlns:a16="http://schemas.microsoft.com/office/drawing/2014/main" id="{EE6E6298-661C-80D4-5E2B-094BD7361634}"/>
+              </a:ext>
+            </a:extLst>
+          </p:cNvPr>
+          <p:cNvSpPr txBox="1"/>
+          <p:nvPr/>
+        </p:nvSpPr>
+        <p:spPr>
+          <a:xfrm>
+            <a:off x="1412959" y="5914711"/>
+            <a:ext cx="3788229" cy="369332"/>
+          </a:xfrm>
+          <a:prstGeom prst="rect">
+            <a:avLst/>
+          </a:prstGeom>
+          <a:noFill/>
+        </p:spPr>
+        <p:txBody>
+          <a:bodyPr wrap="square" rtlCol="0">
+            <a:spAutoFit/>
+          </a:bodyPr>
+          <a:lstStyle/>
+          <a:p>
+            <a:pPr algn="ctr"/>
+            <a:r>
+              <a:rPr lang="en-US" dirty="0"/>
+              <a:t>0 vs 0</a:t>
+            </a:r>
+          </a:p>
+        </p:txBody>
+      </p:sp>
+      <p:sp>
+        <p:nvSpPr>
+          <p:cNvPr id="6" name="TextBox 5">
+            <a:extLst>
+              <a:ext uri="{FF2B5EF4-FFF2-40B4-BE49-F238E27FC236}">
+                <a16:creationId xmlns:a16="http://schemas.microsoft.com/office/drawing/2014/main" id="{96705664-F71B-1EDD-28A3-108518D5BC5D}"/>
+              </a:ext>
+            </a:extLst>
+          </p:cNvPr>
+          <p:cNvSpPr txBox="1"/>
+          <p:nvPr/>
+        </p:nvSpPr>
+        <p:spPr>
+          <a:xfrm>
+            <a:off x="6990814" y="5914711"/>
+            <a:ext cx="3788229" cy="369332"/>
+          </a:xfrm>
+          <a:prstGeom prst="rect">
+            <a:avLst/>
+          </a:prstGeom>
+          <a:noFill/>
+        </p:spPr>
+        <p:txBody>
+          <a:bodyPr wrap="square" rtlCol="0">
+            <a:spAutoFit/>
+          </a:bodyPr>
+          <a:lstStyle/>
+          <a:p>
+            <a:pPr algn="ctr"/>
+            <a:r>
+              <a:rPr lang="en-US" dirty="0"/>
+              <a:t>50 vs 0</a:t>
+            </a:r>
+          </a:p>
+        </p:txBody>
+      </p:sp>
+      <p:pic>
+        <p:nvPicPr>
+          <p:cNvPr id="5" name="Picture 4" descr="A graph of a number of people&#10;&#10;AI-generated content may be incorrect.">
+            <a:extLst>
+              <a:ext uri="{FF2B5EF4-FFF2-40B4-BE49-F238E27FC236}">
+                <a16:creationId xmlns:a16="http://schemas.microsoft.com/office/drawing/2014/main" id="{19D3B6A1-53BF-CB96-511F-2F43639DFB9C}"/>
+              </a:ext>
+            </a:extLst>
+          </p:cNvPr>
+          <p:cNvPicPr>
+            <a:picLocks noChangeAspect="1"/>
+          </p:cNvPicPr>
+          <p:nvPr/>
+        </p:nvPicPr>
+        <p:blipFill>
+          <a:blip r:embed="rId2">
+            <a:extLst>
+              <a:ext uri="{28A0092B-C50C-407E-A947-70E740481C1C}">
+                <a14:useLocalDpi xmlns:a14="http://schemas.microsoft.com/office/drawing/2010/main" val="0"/>
+              </a:ext>
+            </a:extLst>
+          </a:blip>
+          <a:stretch>
+            <a:fillRect/>
+          </a:stretch>
+        </p:blipFill>
+        <p:spPr>
+          <a:xfrm>
+            <a:off x="518147" y="1714496"/>
+            <a:ext cx="5577851" cy="4114808"/>
+          </a:xfrm>
+          <a:prstGeom prst="rect">
+            <a:avLst/>
+          </a:prstGeom>
+        </p:spPr>
+      </p:pic>
+      <p:pic>
+        <p:nvPicPr>
+          <p:cNvPr id="8" name="Picture 7" descr="A graph of a graph of a number of people&#10;&#10;AI-generated content may be incorrect.">
+            <a:extLst>
+              <a:ext uri="{FF2B5EF4-FFF2-40B4-BE49-F238E27FC236}">
+                <a16:creationId xmlns:a16="http://schemas.microsoft.com/office/drawing/2014/main" id="{921B3F1E-37D5-9684-F070-941A05DB2841}"/>
+              </a:ext>
+            </a:extLst>
+          </p:cNvPr>
+          <p:cNvPicPr>
+            <a:picLocks noChangeAspect="1"/>
+          </p:cNvPicPr>
+          <p:nvPr/>
+        </p:nvPicPr>
+        <p:blipFill>
+          <a:blip r:embed="rId3">
+            <a:extLst>
+              <a:ext uri="{28A0092B-C50C-407E-A947-70E740481C1C}">
+                <a14:useLocalDpi xmlns:a14="http://schemas.microsoft.com/office/drawing/2010/main" val="0"/>
+              </a:ext>
+            </a:extLst>
+          </a:blip>
+          <a:stretch>
+            <a:fillRect/>
+          </a:stretch>
+        </p:blipFill>
+        <p:spPr>
+          <a:xfrm>
+            <a:off x="6095998" y="1710671"/>
+            <a:ext cx="5577851" cy="4114808"/>
+          </a:xfrm>
+          <a:prstGeom prst="rect">
+            <a:avLst/>
+          </a:prstGeom>
+        </p:spPr>
+      </p:pic>
+    </p:spTree>
+    <p:extLst>
+      <p:ext uri="{BB962C8B-B14F-4D97-AF65-F5344CB8AC3E}">
+        <p14:creationId xmlns:p14="http://schemas.microsoft.com/office/powerpoint/2010/main" val="3937518327"/>
       </p:ext>
     </p:extLst>
   </p:cSld>

</xml_diff>

<commit_message>
Add angle correction results
</commit_message>
<xml_diff>
--- a/archive/triplet-loss-open-world/stn-presentation.pptx
+++ b/archive/triplet-loss-open-world/stn-presentation.pptx
@@ -12,6 +12,15 @@
     <p:sldId id="262" r:id="rId6"/>
     <p:sldId id="263" r:id="rId7"/>
     <p:sldId id="264" r:id="rId8"/>
+    <p:sldId id="272" r:id="rId9"/>
+    <p:sldId id="265" r:id="rId10"/>
+    <p:sldId id="266" r:id="rId11"/>
+    <p:sldId id="267" r:id="rId12"/>
+    <p:sldId id="268" r:id="rId13"/>
+    <p:sldId id="269" r:id="rId14"/>
+    <p:sldId id="270" r:id="rId15"/>
+    <p:sldId id="271" r:id="rId16"/>
+    <p:sldId id="273" r:id="rId17"/>
   </p:sldIdLst>
   <p:sldSz cx="12192000" cy="6858000"/>
   <p:notesSz cx="6858000" cy="9144000"/>
@@ -265,7 +274,7 @@
           <a:p>
             <a:fld id="{8402897A-896A-4154-87C8-C31DD00E0267}" type="datetimeFigureOut">
               <a:rPr lang="en-US" smtClean="0"/>
-              <a:t>4/21/2025</a:t>
+              <a:t>4/25/2025</a:t>
             </a:fld>
             <a:endParaRPr lang="en-US"/>
           </a:p>
@@ -463,7 +472,7 @@
           <a:p>
             <a:fld id="{8402897A-896A-4154-87C8-C31DD00E0267}" type="datetimeFigureOut">
               <a:rPr lang="en-US" smtClean="0"/>
-              <a:t>4/21/2025</a:t>
+              <a:t>4/25/2025</a:t>
             </a:fld>
             <a:endParaRPr lang="en-US"/>
           </a:p>
@@ -671,7 +680,7 @@
           <a:p>
             <a:fld id="{8402897A-896A-4154-87C8-C31DD00E0267}" type="datetimeFigureOut">
               <a:rPr lang="en-US" smtClean="0"/>
-              <a:t>4/21/2025</a:t>
+              <a:t>4/25/2025</a:t>
             </a:fld>
             <a:endParaRPr lang="en-US"/>
           </a:p>
@@ -869,7 +878,7 @@
           <a:p>
             <a:fld id="{8402897A-896A-4154-87C8-C31DD00E0267}" type="datetimeFigureOut">
               <a:rPr lang="en-US" smtClean="0"/>
-              <a:t>4/21/2025</a:t>
+              <a:t>4/25/2025</a:t>
             </a:fld>
             <a:endParaRPr lang="en-US"/>
           </a:p>
@@ -1144,7 +1153,7 @@
           <a:p>
             <a:fld id="{8402897A-896A-4154-87C8-C31DD00E0267}" type="datetimeFigureOut">
               <a:rPr lang="en-US" smtClean="0"/>
-              <a:t>4/21/2025</a:t>
+              <a:t>4/25/2025</a:t>
             </a:fld>
             <a:endParaRPr lang="en-US"/>
           </a:p>
@@ -1409,7 +1418,7 @@
           <a:p>
             <a:fld id="{8402897A-896A-4154-87C8-C31DD00E0267}" type="datetimeFigureOut">
               <a:rPr lang="en-US" smtClean="0"/>
-              <a:t>4/21/2025</a:t>
+              <a:t>4/25/2025</a:t>
             </a:fld>
             <a:endParaRPr lang="en-US"/>
           </a:p>
@@ -1821,7 +1830,7 @@
           <a:p>
             <a:fld id="{8402897A-896A-4154-87C8-C31DD00E0267}" type="datetimeFigureOut">
               <a:rPr lang="en-US" smtClean="0"/>
-              <a:t>4/21/2025</a:t>
+              <a:t>4/25/2025</a:t>
             </a:fld>
             <a:endParaRPr lang="en-US"/>
           </a:p>
@@ -1962,7 +1971,7 @@
           <a:p>
             <a:fld id="{8402897A-896A-4154-87C8-C31DD00E0267}" type="datetimeFigureOut">
               <a:rPr lang="en-US" smtClean="0"/>
-              <a:t>4/21/2025</a:t>
+              <a:t>4/25/2025</a:t>
             </a:fld>
             <a:endParaRPr lang="en-US"/>
           </a:p>
@@ -2075,7 +2084,7 @@
           <a:p>
             <a:fld id="{8402897A-896A-4154-87C8-C31DD00E0267}" type="datetimeFigureOut">
               <a:rPr lang="en-US" smtClean="0"/>
-              <a:t>4/21/2025</a:t>
+              <a:t>4/25/2025</a:t>
             </a:fld>
             <a:endParaRPr lang="en-US"/>
           </a:p>
@@ -2386,7 +2395,7 @@
           <a:p>
             <a:fld id="{8402897A-896A-4154-87C8-C31DD00E0267}" type="datetimeFigureOut">
               <a:rPr lang="en-US" smtClean="0"/>
-              <a:t>4/21/2025</a:t>
+              <a:t>4/25/2025</a:t>
             </a:fld>
             <a:endParaRPr lang="en-US"/>
           </a:p>
@@ -2674,7 +2683,7 @@
           <a:p>
             <a:fld id="{8402897A-896A-4154-87C8-C31DD00E0267}" type="datetimeFigureOut">
               <a:rPr lang="en-US" smtClean="0"/>
-              <a:t>4/21/2025</a:t>
+              <a:t>4/25/2025</a:t>
             </a:fld>
             <a:endParaRPr lang="en-US"/>
           </a:p>
@@ -2915,7 +2924,7 @@
           <a:p>
             <a:fld id="{8402897A-896A-4154-87C8-C31DD00E0267}" type="datetimeFigureOut">
               <a:rPr lang="en-US" smtClean="0"/>
-              <a:t>4/21/2025</a:t>
+              <a:t>4/25/2025</a:t>
             </a:fld>
             <a:endParaRPr lang="en-US"/>
           </a:p>
@@ -3406,6 +3415,1325 @@
 </p:sld>
 </file>
 
+<file path=ppt/slides/slide10.xml><?xml version="1.0" encoding="utf-8"?>
+<p:sld xmlns:a="http://schemas.openxmlformats.org/drawingml/2006/main" xmlns:r="http://schemas.openxmlformats.org/officeDocument/2006/relationships" xmlns:p="http://schemas.openxmlformats.org/presentationml/2006/main">
+  <p:cSld>
+    <p:spTree>
+      <p:nvGrpSpPr>
+        <p:cNvPr id="1" name="">
+          <a:extLst>
+            <a:ext uri="{FF2B5EF4-FFF2-40B4-BE49-F238E27FC236}">
+              <a16:creationId xmlns:a16="http://schemas.microsoft.com/office/drawing/2014/main" id="{B8FA4F8E-965B-45F0-341B-0ACD56685A00}"/>
+            </a:ext>
+          </a:extLst>
+        </p:cNvPr>
+        <p:cNvGrpSpPr/>
+        <p:nvPr/>
+      </p:nvGrpSpPr>
+      <p:grpSpPr>
+        <a:xfrm>
+          <a:off x="0" y="0"/>
+          <a:ext cx="0" cy="0"/>
+          <a:chOff x="0" y="0"/>
+          <a:chExt cx="0" cy="0"/>
+        </a:xfrm>
+      </p:grpSpPr>
+      <p:pic>
+        <p:nvPicPr>
+          <p:cNvPr id="4" name="Picture 3" descr="A close-up of several images of eye&#10;&#10;AI-generated content may be incorrect.">
+            <a:extLst>
+              <a:ext uri="{FF2B5EF4-FFF2-40B4-BE49-F238E27FC236}">
+                <a16:creationId xmlns:a16="http://schemas.microsoft.com/office/drawing/2014/main" id="{AC5451B5-C34C-6691-EFFD-D501E8647552}"/>
+              </a:ext>
+            </a:extLst>
+          </p:cNvPr>
+          <p:cNvPicPr>
+            <a:picLocks noChangeAspect="1"/>
+          </p:cNvPicPr>
+          <p:nvPr/>
+        </p:nvPicPr>
+        <p:blipFill>
+          <a:blip r:embed="rId2">
+            <a:extLst>
+              <a:ext uri="{28A0092B-C50C-407E-A947-70E740481C1C}">
+                <a14:useLocalDpi xmlns:a14="http://schemas.microsoft.com/office/drawing/2010/main" val="0"/>
+              </a:ext>
+            </a:extLst>
+          </a:blip>
+          <a:stretch>
+            <a:fillRect/>
+          </a:stretch>
+        </p:blipFill>
+        <p:spPr>
+          <a:xfrm>
+            <a:off x="1523990" y="2285991"/>
+            <a:ext cx="9144019" cy="4572009"/>
+          </a:xfrm>
+          <a:prstGeom prst="rect">
+            <a:avLst/>
+          </a:prstGeom>
+        </p:spPr>
+      </p:pic>
+      <p:sp>
+        <p:nvSpPr>
+          <p:cNvPr id="2" name="Title 1">
+            <a:extLst>
+              <a:ext uri="{FF2B5EF4-FFF2-40B4-BE49-F238E27FC236}">
+                <a16:creationId xmlns:a16="http://schemas.microsoft.com/office/drawing/2014/main" id="{AE7F0515-4406-F749-D495-2F62705AA9F6}"/>
+              </a:ext>
+            </a:extLst>
+          </p:cNvPr>
+          <p:cNvSpPr>
+            <a:spLocks noGrp="1"/>
+          </p:cNvSpPr>
+          <p:nvPr>
+            <p:ph type="title"/>
+          </p:nvPr>
+        </p:nvSpPr>
+        <p:spPr/>
+        <p:txBody>
+          <a:bodyPr/>
+          <a:lstStyle/>
+          <a:p>
+            <a:r>
+              <a:rPr lang="en-US" dirty="0"/>
+              <a:t>Angle Correction Preprocessing</a:t>
+            </a:r>
+          </a:p>
+        </p:txBody>
+      </p:sp>
+      <p:sp>
+        <p:nvSpPr>
+          <p:cNvPr id="6" name="Content Placeholder 2">
+            <a:extLst>
+              <a:ext uri="{FF2B5EF4-FFF2-40B4-BE49-F238E27FC236}">
+                <a16:creationId xmlns:a16="http://schemas.microsoft.com/office/drawing/2014/main" id="{702436C7-3940-6F00-501B-613E0B6DCDB8}"/>
+              </a:ext>
+            </a:extLst>
+          </p:cNvPr>
+          <p:cNvSpPr>
+            <a:spLocks noGrp="1"/>
+          </p:cNvSpPr>
+          <p:nvPr>
+            <p:ph idx="1"/>
+          </p:nvPr>
+        </p:nvSpPr>
+        <p:spPr>
+          <a:xfrm>
+            <a:off x="838200" y="1825624"/>
+            <a:ext cx="10515600" cy="1146175"/>
+          </a:xfrm>
+        </p:spPr>
+        <p:txBody>
+          <a:bodyPr>
+            <a:normAutofit/>
+          </a:bodyPr>
+          <a:lstStyle/>
+          <a:p>
+            <a:r>
+              <a:rPr lang="en-US" dirty="0"/>
+              <a:t>Apply a static transformation based on capture angle</a:t>
+            </a:r>
+          </a:p>
+          <a:p>
+            <a:pPr lvl="1"/>
+            <a:r>
+              <a:rPr lang="en-US" dirty="0"/>
+              <a:t>Example angle -50 transformation:</a:t>
+            </a:r>
+          </a:p>
+        </p:txBody>
+      </p:sp>
+    </p:spTree>
+    <p:extLst>
+      <p:ext uri="{BB962C8B-B14F-4D97-AF65-F5344CB8AC3E}">
+        <p14:creationId xmlns:p14="http://schemas.microsoft.com/office/powerpoint/2010/main" val="2384695387"/>
+      </p:ext>
+    </p:extLst>
+  </p:cSld>
+  <p:clrMapOvr>
+    <a:masterClrMapping/>
+  </p:clrMapOvr>
+</p:sld>
+</file>
+
+<file path=ppt/slides/slide11.xml><?xml version="1.0" encoding="utf-8"?>
+<p:sld xmlns:a="http://schemas.openxmlformats.org/drawingml/2006/main" xmlns:r="http://schemas.openxmlformats.org/officeDocument/2006/relationships" xmlns:p="http://schemas.openxmlformats.org/presentationml/2006/main">
+  <p:cSld>
+    <p:spTree>
+      <p:nvGrpSpPr>
+        <p:cNvPr id="1" name="">
+          <a:extLst>
+            <a:ext uri="{FF2B5EF4-FFF2-40B4-BE49-F238E27FC236}">
+              <a16:creationId xmlns:a16="http://schemas.microsoft.com/office/drawing/2014/main" id="{92A1161D-00CE-3B25-E366-A3AB3FB9BCBC}"/>
+            </a:ext>
+          </a:extLst>
+        </p:cNvPr>
+        <p:cNvGrpSpPr/>
+        <p:nvPr/>
+      </p:nvGrpSpPr>
+      <p:grpSpPr>
+        <a:xfrm>
+          <a:off x="0" y="0"/>
+          <a:ext cx="0" cy="0"/>
+          <a:chOff x="0" y="0"/>
+          <a:chExt cx="0" cy="0"/>
+        </a:xfrm>
+      </p:grpSpPr>
+      <p:sp>
+        <p:nvSpPr>
+          <p:cNvPr id="2" name="Title 1">
+            <a:extLst>
+              <a:ext uri="{FF2B5EF4-FFF2-40B4-BE49-F238E27FC236}">
+                <a16:creationId xmlns:a16="http://schemas.microsoft.com/office/drawing/2014/main" id="{2B6D4443-9653-D915-435D-FBA83653F24B}"/>
+              </a:ext>
+            </a:extLst>
+          </p:cNvPr>
+          <p:cNvSpPr>
+            <a:spLocks noGrp="1"/>
+          </p:cNvSpPr>
+          <p:nvPr>
+            <p:ph type="title"/>
+          </p:nvPr>
+        </p:nvSpPr>
+        <p:spPr/>
+        <p:txBody>
+          <a:bodyPr/>
+          <a:lstStyle/>
+          <a:p>
+            <a:r>
+              <a:rPr lang="en-US" dirty="0"/>
+              <a:t>Angle vs Angle Results</a:t>
+            </a:r>
+          </a:p>
+        </p:txBody>
+      </p:sp>
+      <p:sp>
+        <p:nvSpPr>
+          <p:cNvPr id="8" name="TextBox 7">
+            <a:extLst>
+              <a:ext uri="{FF2B5EF4-FFF2-40B4-BE49-F238E27FC236}">
+                <a16:creationId xmlns:a16="http://schemas.microsoft.com/office/drawing/2014/main" id="{D9A9F7F5-58DF-356A-B733-1D16CB134FB6}"/>
+              </a:ext>
+            </a:extLst>
+          </p:cNvPr>
+          <p:cNvSpPr txBox="1"/>
+          <p:nvPr/>
+        </p:nvSpPr>
+        <p:spPr>
+          <a:xfrm>
+            <a:off x="1412959" y="5914711"/>
+            <a:ext cx="3788229" cy="369332"/>
+          </a:xfrm>
+          <a:prstGeom prst="rect">
+            <a:avLst/>
+          </a:prstGeom>
+          <a:noFill/>
+        </p:spPr>
+        <p:txBody>
+          <a:bodyPr wrap="square" rtlCol="0">
+            <a:spAutoFit/>
+          </a:bodyPr>
+          <a:lstStyle/>
+          <a:p>
+            <a:pPr algn="ctr"/>
+            <a:r>
+              <a:rPr lang="en-US" dirty="0" err="1"/>
+              <a:t>ConvNeXt</a:t>
+            </a:r>
+            <a:endParaRPr lang="en-US" dirty="0"/>
+          </a:p>
+        </p:txBody>
+      </p:sp>
+      <p:sp>
+        <p:nvSpPr>
+          <p:cNvPr id="11" name="TextBox 10">
+            <a:extLst>
+              <a:ext uri="{FF2B5EF4-FFF2-40B4-BE49-F238E27FC236}">
+                <a16:creationId xmlns:a16="http://schemas.microsoft.com/office/drawing/2014/main" id="{12129582-2F6D-241A-9498-2BC30D6C6757}"/>
+              </a:ext>
+            </a:extLst>
+          </p:cNvPr>
+          <p:cNvSpPr txBox="1"/>
+          <p:nvPr/>
+        </p:nvSpPr>
+        <p:spPr>
+          <a:xfrm>
+            <a:off x="6990810" y="5914711"/>
+            <a:ext cx="3788229" cy="369332"/>
+          </a:xfrm>
+          <a:prstGeom prst="rect">
+            <a:avLst/>
+          </a:prstGeom>
+          <a:noFill/>
+        </p:spPr>
+        <p:txBody>
+          <a:bodyPr wrap="square" rtlCol="0">
+            <a:spAutoFit/>
+          </a:bodyPr>
+          <a:lstStyle/>
+          <a:p>
+            <a:pPr algn="ctr"/>
+            <a:r>
+              <a:rPr lang="en-US" dirty="0"/>
+              <a:t>Angle Correction + </a:t>
+            </a:r>
+            <a:r>
+              <a:rPr lang="en-US" dirty="0" err="1"/>
+              <a:t>ConvNeXt</a:t>
+            </a:r>
+            <a:endParaRPr lang="en-US" dirty="0"/>
+          </a:p>
+        </p:txBody>
+      </p:sp>
+      <p:pic>
+        <p:nvPicPr>
+          <p:cNvPr id="12" name="Picture 11" descr="A graph with a line and numbers&#10;&#10;AI-generated content may be incorrect.">
+            <a:extLst>
+              <a:ext uri="{FF2B5EF4-FFF2-40B4-BE49-F238E27FC236}">
+                <a16:creationId xmlns:a16="http://schemas.microsoft.com/office/drawing/2014/main" id="{72D3A908-ADD7-D3A8-E9B1-99E1AD4054A1}"/>
+              </a:ext>
+            </a:extLst>
+          </p:cNvPr>
+          <p:cNvPicPr>
+            <a:picLocks noChangeAspect="1"/>
+          </p:cNvPicPr>
+          <p:nvPr/>
+        </p:nvPicPr>
+        <p:blipFill>
+          <a:blip r:embed="rId2">
+            <a:extLst>
+              <a:ext uri="{28A0092B-C50C-407E-A947-70E740481C1C}">
+                <a14:useLocalDpi xmlns:a14="http://schemas.microsoft.com/office/drawing/2010/main" val="0"/>
+              </a:ext>
+            </a:extLst>
+          </a:blip>
+          <a:stretch>
+            <a:fillRect/>
+          </a:stretch>
+        </p:blipFill>
+        <p:spPr>
+          <a:xfrm>
+            <a:off x="515100" y="1714496"/>
+            <a:ext cx="5580899" cy="4114808"/>
+          </a:xfrm>
+          <a:prstGeom prst="rect">
+            <a:avLst/>
+          </a:prstGeom>
+        </p:spPr>
+      </p:pic>
+      <p:pic>
+        <p:nvPicPr>
+          <p:cNvPr id="4" name="Picture 3" descr="A graph with numbers and lines&#10;&#10;AI-generated content may be incorrect.">
+            <a:extLst>
+              <a:ext uri="{FF2B5EF4-FFF2-40B4-BE49-F238E27FC236}">
+                <a16:creationId xmlns:a16="http://schemas.microsoft.com/office/drawing/2014/main" id="{2648AA78-4558-F1EF-EDEC-45BEF116A97B}"/>
+              </a:ext>
+            </a:extLst>
+          </p:cNvPr>
+          <p:cNvPicPr>
+            <a:picLocks noChangeAspect="1"/>
+          </p:cNvPicPr>
+          <p:nvPr/>
+        </p:nvPicPr>
+        <p:blipFill>
+          <a:blip r:embed="rId3">
+            <a:extLst>
+              <a:ext uri="{28A0092B-C50C-407E-A947-70E740481C1C}">
+                <a14:useLocalDpi xmlns:a14="http://schemas.microsoft.com/office/drawing/2010/main" val="0"/>
+              </a:ext>
+            </a:extLst>
+          </a:blip>
+          <a:stretch>
+            <a:fillRect/>
+          </a:stretch>
+        </p:blipFill>
+        <p:spPr>
+          <a:xfrm>
+            <a:off x="6094474" y="1799903"/>
+            <a:ext cx="5580899" cy="4114808"/>
+          </a:xfrm>
+          <a:prstGeom prst="rect">
+            <a:avLst/>
+          </a:prstGeom>
+        </p:spPr>
+      </p:pic>
+    </p:spTree>
+    <p:extLst>
+      <p:ext uri="{BB962C8B-B14F-4D97-AF65-F5344CB8AC3E}">
+        <p14:creationId xmlns:p14="http://schemas.microsoft.com/office/powerpoint/2010/main" val="593525523"/>
+      </p:ext>
+    </p:extLst>
+  </p:cSld>
+  <p:clrMapOvr>
+    <a:masterClrMapping/>
+  </p:clrMapOvr>
+</p:sld>
+</file>
+
+<file path=ppt/slides/slide12.xml><?xml version="1.0" encoding="utf-8"?>
+<p:sld xmlns:a="http://schemas.openxmlformats.org/drawingml/2006/main" xmlns:r="http://schemas.openxmlformats.org/officeDocument/2006/relationships" xmlns:p="http://schemas.openxmlformats.org/presentationml/2006/main">
+  <p:cSld>
+    <p:spTree>
+      <p:nvGrpSpPr>
+        <p:cNvPr id="1" name="">
+          <a:extLst>
+            <a:ext uri="{FF2B5EF4-FFF2-40B4-BE49-F238E27FC236}">
+              <a16:creationId xmlns:a16="http://schemas.microsoft.com/office/drawing/2014/main" id="{C3E8D8E5-5362-B5C7-C7D8-4340545B6EFE}"/>
+            </a:ext>
+          </a:extLst>
+        </p:cNvPr>
+        <p:cNvGrpSpPr/>
+        <p:nvPr/>
+      </p:nvGrpSpPr>
+      <p:grpSpPr>
+        <a:xfrm>
+          <a:off x="0" y="0"/>
+          <a:ext cx="0" cy="0"/>
+          <a:chOff x="0" y="0"/>
+          <a:chExt cx="0" cy="0"/>
+        </a:xfrm>
+      </p:grpSpPr>
+      <p:sp>
+        <p:nvSpPr>
+          <p:cNvPr id="2" name="Title 1">
+            <a:extLst>
+              <a:ext uri="{FF2B5EF4-FFF2-40B4-BE49-F238E27FC236}">
+                <a16:creationId xmlns:a16="http://schemas.microsoft.com/office/drawing/2014/main" id="{66570820-C450-2017-153E-5F5FF8CEFE42}"/>
+              </a:ext>
+            </a:extLst>
+          </p:cNvPr>
+          <p:cNvSpPr>
+            <a:spLocks noGrp="1"/>
+          </p:cNvSpPr>
+          <p:nvPr>
+            <p:ph type="title"/>
+          </p:nvPr>
+        </p:nvSpPr>
+        <p:spPr/>
+        <p:txBody>
+          <a:bodyPr/>
+          <a:lstStyle/>
+          <a:p>
+            <a:r>
+              <a:rPr lang="en-US" dirty="0"/>
+              <a:t>Angle vs Frontal Results</a:t>
+            </a:r>
+          </a:p>
+        </p:txBody>
+      </p:sp>
+      <p:sp>
+        <p:nvSpPr>
+          <p:cNvPr id="8" name="TextBox 7">
+            <a:extLst>
+              <a:ext uri="{FF2B5EF4-FFF2-40B4-BE49-F238E27FC236}">
+                <a16:creationId xmlns:a16="http://schemas.microsoft.com/office/drawing/2014/main" id="{47232B7F-2A9C-C538-7378-20D38352C6D2}"/>
+              </a:ext>
+            </a:extLst>
+          </p:cNvPr>
+          <p:cNvSpPr txBox="1"/>
+          <p:nvPr/>
+        </p:nvSpPr>
+        <p:spPr>
+          <a:xfrm>
+            <a:off x="1412959" y="5914711"/>
+            <a:ext cx="3788229" cy="369332"/>
+          </a:xfrm>
+          <a:prstGeom prst="rect">
+            <a:avLst/>
+          </a:prstGeom>
+          <a:noFill/>
+        </p:spPr>
+        <p:txBody>
+          <a:bodyPr wrap="square" rtlCol="0">
+            <a:spAutoFit/>
+          </a:bodyPr>
+          <a:lstStyle/>
+          <a:p>
+            <a:pPr algn="ctr"/>
+            <a:r>
+              <a:rPr lang="en-US" dirty="0" err="1"/>
+              <a:t>ConvNeXt</a:t>
+            </a:r>
+            <a:endParaRPr lang="en-US" dirty="0"/>
+          </a:p>
+        </p:txBody>
+      </p:sp>
+      <p:sp>
+        <p:nvSpPr>
+          <p:cNvPr id="9" name="TextBox 8">
+            <a:extLst>
+              <a:ext uri="{FF2B5EF4-FFF2-40B4-BE49-F238E27FC236}">
+                <a16:creationId xmlns:a16="http://schemas.microsoft.com/office/drawing/2014/main" id="{B95E4B81-364D-9612-2042-B36810654269}"/>
+              </a:ext>
+            </a:extLst>
+          </p:cNvPr>
+          <p:cNvSpPr txBox="1"/>
+          <p:nvPr/>
+        </p:nvSpPr>
+        <p:spPr>
+          <a:xfrm>
+            <a:off x="6990814" y="5914711"/>
+            <a:ext cx="3788229" cy="369332"/>
+          </a:xfrm>
+          <a:prstGeom prst="rect">
+            <a:avLst/>
+          </a:prstGeom>
+          <a:noFill/>
+        </p:spPr>
+        <p:txBody>
+          <a:bodyPr wrap="square" rtlCol="0">
+            <a:spAutoFit/>
+          </a:bodyPr>
+          <a:lstStyle/>
+          <a:p>
+            <a:pPr algn="ctr"/>
+            <a:r>
+              <a:rPr lang="en-US" dirty="0"/>
+              <a:t>Angle Correction + </a:t>
+            </a:r>
+            <a:r>
+              <a:rPr lang="en-US" dirty="0" err="1"/>
+              <a:t>ConvNeXt</a:t>
+            </a:r>
+            <a:endParaRPr lang="en-US" dirty="0"/>
+          </a:p>
+        </p:txBody>
+      </p:sp>
+      <p:pic>
+        <p:nvPicPr>
+          <p:cNvPr id="10" name="Picture 9" descr="A graph of different angles&#10;&#10;AI-generated content may be incorrect.">
+            <a:extLst>
+              <a:ext uri="{FF2B5EF4-FFF2-40B4-BE49-F238E27FC236}">
+                <a16:creationId xmlns:a16="http://schemas.microsoft.com/office/drawing/2014/main" id="{3EE55A41-03C6-CD12-69E2-AB10384D99DC}"/>
+              </a:ext>
+            </a:extLst>
+          </p:cNvPr>
+          <p:cNvPicPr>
+            <a:picLocks noChangeAspect="1"/>
+          </p:cNvPicPr>
+          <p:nvPr/>
+        </p:nvPicPr>
+        <p:blipFill>
+          <a:blip r:embed="rId2">
+            <a:extLst>
+              <a:ext uri="{28A0092B-C50C-407E-A947-70E740481C1C}">
+                <a14:useLocalDpi xmlns:a14="http://schemas.microsoft.com/office/drawing/2010/main" val="0"/>
+              </a:ext>
+            </a:extLst>
+          </a:blip>
+          <a:stretch>
+            <a:fillRect/>
+          </a:stretch>
+        </p:blipFill>
+        <p:spPr>
+          <a:xfrm>
+            <a:off x="518151" y="1720832"/>
+            <a:ext cx="5580899" cy="4114808"/>
+          </a:xfrm>
+          <a:prstGeom prst="rect">
+            <a:avLst/>
+          </a:prstGeom>
+        </p:spPr>
+      </p:pic>
+      <p:pic>
+        <p:nvPicPr>
+          <p:cNvPr id="4" name="Picture 3" descr="A graph of different angles&#10;&#10;AI-generated content may be incorrect.">
+            <a:extLst>
+              <a:ext uri="{FF2B5EF4-FFF2-40B4-BE49-F238E27FC236}">
+                <a16:creationId xmlns:a16="http://schemas.microsoft.com/office/drawing/2014/main" id="{43B765D3-EC28-AB07-8273-A25D4DA4DFD5}"/>
+              </a:ext>
+            </a:extLst>
+          </p:cNvPr>
+          <p:cNvPicPr>
+            <a:picLocks noChangeAspect="1"/>
+          </p:cNvPicPr>
+          <p:nvPr/>
+        </p:nvPicPr>
+        <p:blipFill>
+          <a:blip r:embed="rId3">
+            <a:extLst>
+              <a:ext uri="{28A0092B-C50C-407E-A947-70E740481C1C}">
+                <a14:useLocalDpi xmlns:a14="http://schemas.microsoft.com/office/drawing/2010/main" val="0"/>
+              </a:ext>
+            </a:extLst>
+          </a:blip>
+          <a:stretch>
+            <a:fillRect/>
+          </a:stretch>
+        </p:blipFill>
+        <p:spPr>
+          <a:xfrm>
+            <a:off x="6096000" y="1799903"/>
+            <a:ext cx="5580899" cy="4114808"/>
+          </a:xfrm>
+          <a:prstGeom prst="rect">
+            <a:avLst/>
+          </a:prstGeom>
+        </p:spPr>
+      </p:pic>
+    </p:spTree>
+    <p:extLst>
+      <p:ext uri="{BB962C8B-B14F-4D97-AF65-F5344CB8AC3E}">
+        <p14:creationId xmlns:p14="http://schemas.microsoft.com/office/powerpoint/2010/main" val="1565141813"/>
+      </p:ext>
+    </p:extLst>
+  </p:cSld>
+  <p:clrMapOvr>
+    <a:masterClrMapping/>
+  </p:clrMapOvr>
+</p:sld>
+</file>
+
+<file path=ppt/slides/slide13.xml><?xml version="1.0" encoding="utf-8"?>
+<p:sld xmlns:a="http://schemas.openxmlformats.org/drawingml/2006/main" xmlns:r="http://schemas.openxmlformats.org/officeDocument/2006/relationships" xmlns:p="http://schemas.openxmlformats.org/presentationml/2006/main">
+  <p:cSld>
+    <p:spTree>
+      <p:nvGrpSpPr>
+        <p:cNvPr id="1" name="">
+          <a:extLst>
+            <a:ext uri="{FF2B5EF4-FFF2-40B4-BE49-F238E27FC236}">
+              <a16:creationId xmlns:a16="http://schemas.microsoft.com/office/drawing/2014/main" id="{4B71C9E7-85C6-54B6-8095-9B9DC8DB2E1B}"/>
+            </a:ext>
+          </a:extLst>
+        </p:cNvPr>
+        <p:cNvGrpSpPr/>
+        <p:nvPr/>
+      </p:nvGrpSpPr>
+      <p:grpSpPr>
+        <a:xfrm>
+          <a:off x="0" y="0"/>
+          <a:ext cx="0" cy="0"/>
+          <a:chOff x="0" y="0"/>
+          <a:chExt cx="0" cy="0"/>
+        </a:xfrm>
+      </p:grpSpPr>
+      <p:sp>
+        <p:nvSpPr>
+          <p:cNvPr id="2" name="Title 1">
+            <a:extLst>
+              <a:ext uri="{FF2B5EF4-FFF2-40B4-BE49-F238E27FC236}">
+                <a16:creationId xmlns:a16="http://schemas.microsoft.com/office/drawing/2014/main" id="{1759F92E-981A-BD4C-9C40-A56A431A0D4B}"/>
+              </a:ext>
+            </a:extLst>
+          </p:cNvPr>
+          <p:cNvSpPr>
+            <a:spLocks noGrp="1"/>
+          </p:cNvSpPr>
+          <p:nvPr>
+            <p:ph type="title"/>
+          </p:nvPr>
+        </p:nvSpPr>
+        <p:spPr/>
+        <p:txBody>
+          <a:bodyPr/>
+          <a:lstStyle/>
+          <a:p>
+            <a:r>
+              <a:rPr lang="en-US" dirty="0"/>
+              <a:t>t-SNE Results</a:t>
+            </a:r>
+          </a:p>
+        </p:txBody>
+      </p:sp>
+      <p:sp>
+        <p:nvSpPr>
+          <p:cNvPr id="8" name="TextBox 7">
+            <a:extLst>
+              <a:ext uri="{FF2B5EF4-FFF2-40B4-BE49-F238E27FC236}">
+                <a16:creationId xmlns:a16="http://schemas.microsoft.com/office/drawing/2014/main" id="{609309B4-4FED-E79D-42AC-92F4C7199AFC}"/>
+              </a:ext>
+            </a:extLst>
+          </p:cNvPr>
+          <p:cNvSpPr txBox="1"/>
+          <p:nvPr/>
+        </p:nvSpPr>
+        <p:spPr>
+          <a:xfrm>
+            <a:off x="1412959" y="5914711"/>
+            <a:ext cx="3788229" cy="369332"/>
+          </a:xfrm>
+          <a:prstGeom prst="rect">
+            <a:avLst/>
+          </a:prstGeom>
+          <a:noFill/>
+        </p:spPr>
+        <p:txBody>
+          <a:bodyPr wrap="square" rtlCol="0">
+            <a:spAutoFit/>
+          </a:bodyPr>
+          <a:lstStyle/>
+          <a:p>
+            <a:pPr algn="ctr"/>
+            <a:r>
+              <a:rPr lang="en-US" dirty="0" err="1"/>
+              <a:t>ConvNeXt</a:t>
+            </a:r>
+            <a:endParaRPr lang="en-US" dirty="0"/>
+          </a:p>
+        </p:txBody>
+      </p:sp>
+      <p:sp>
+        <p:nvSpPr>
+          <p:cNvPr id="9" name="TextBox 8">
+            <a:extLst>
+              <a:ext uri="{FF2B5EF4-FFF2-40B4-BE49-F238E27FC236}">
+                <a16:creationId xmlns:a16="http://schemas.microsoft.com/office/drawing/2014/main" id="{6F74C692-BB23-FD78-C68C-9C71112F7F31}"/>
+              </a:ext>
+            </a:extLst>
+          </p:cNvPr>
+          <p:cNvSpPr txBox="1"/>
+          <p:nvPr/>
+        </p:nvSpPr>
+        <p:spPr>
+          <a:xfrm>
+            <a:off x="6990814" y="5914711"/>
+            <a:ext cx="3788229" cy="369332"/>
+          </a:xfrm>
+          <a:prstGeom prst="rect">
+            <a:avLst/>
+          </a:prstGeom>
+          <a:noFill/>
+        </p:spPr>
+        <p:txBody>
+          <a:bodyPr wrap="square" rtlCol="0">
+            <a:spAutoFit/>
+          </a:bodyPr>
+          <a:lstStyle/>
+          <a:p>
+            <a:pPr algn="ctr"/>
+            <a:r>
+              <a:rPr lang="en-US" dirty="0"/>
+              <a:t>Angle Correction + </a:t>
+            </a:r>
+            <a:r>
+              <a:rPr lang="en-US" dirty="0" err="1"/>
+              <a:t>ConvNeXt</a:t>
+            </a:r>
+            <a:endParaRPr lang="en-US" dirty="0"/>
+          </a:p>
+        </p:txBody>
+      </p:sp>
+      <p:pic>
+        <p:nvPicPr>
+          <p:cNvPr id="5" name="Picture 4" descr="A group of colorful shapes&#10;&#10;AI-generated content may be incorrect.">
+            <a:extLst>
+              <a:ext uri="{FF2B5EF4-FFF2-40B4-BE49-F238E27FC236}">
+                <a16:creationId xmlns:a16="http://schemas.microsoft.com/office/drawing/2014/main" id="{8EC201C9-9397-D191-EB42-9FE9ED759AB4}"/>
+              </a:ext>
+            </a:extLst>
+          </p:cNvPr>
+          <p:cNvPicPr>
+            <a:picLocks noChangeAspect="1"/>
+          </p:cNvPicPr>
+          <p:nvPr/>
+        </p:nvPicPr>
+        <p:blipFill>
+          <a:blip r:embed="rId2">
+            <a:extLst>
+              <a:ext uri="{28A0092B-C50C-407E-A947-70E740481C1C}">
+                <a14:useLocalDpi xmlns:a14="http://schemas.microsoft.com/office/drawing/2010/main" val="0"/>
+              </a:ext>
+            </a:extLst>
+          </a:blip>
+          <a:stretch>
+            <a:fillRect/>
+          </a:stretch>
+        </p:blipFill>
+        <p:spPr>
+          <a:xfrm>
+            <a:off x="488003" y="1714496"/>
+            <a:ext cx="5577851" cy="4114808"/>
+          </a:xfrm>
+          <a:prstGeom prst="rect">
+            <a:avLst/>
+          </a:prstGeom>
+        </p:spPr>
+      </p:pic>
+      <p:pic>
+        <p:nvPicPr>
+          <p:cNvPr id="4" name="Picture 3" descr="A group of colorful dots&#10;&#10;AI-generated content may be incorrect.">
+            <a:extLst>
+              <a:ext uri="{FF2B5EF4-FFF2-40B4-BE49-F238E27FC236}">
+                <a16:creationId xmlns:a16="http://schemas.microsoft.com/office/drawing/2014/main" id="{1343E77C-FFB7-9433-1EEF-0F9319A7A3ED}"/>
+              </a:ext>
+            </a:extLst>
+          </p:cNvPr>
+          <p:cNvPicPr>
+            <a:picLocks noChangeAspect="1"/>
+          </p:cNvPicPr>
+          <p:nvPr/>
+        </p:nvPicPr>
+        <p:blipFill>
+          <a:blip r:embed="rId3">
+            <a:extLst>
+              <a:ext uri="{28A0092B-C50C-407E-A947-70E740481C1C}">
+                <a14:useLocalDpi xmlns:a14="http://schemas.microsoft.com/office/drawing/2010/main" val="0"/>
+              </a:ext>
+            </a:extLst>
+          </a:blip>
+          <a:stretch>
+            <a:fillRect/>
+          </a:stretch>
+        </p:blipFill>
+        <p:spPr>
+          <a:xfrm>
+            <a:off x="6096002" y="1714496"/>
+            <a:ext cx="5577851" cy="4114808"/>
+          </a:xfrm>
+          <a:prstGeom prst="rect">
+            <a:avLst/>
+          </a:prstGeom>
+        </p:spPr>
+      </p:pic>
+    </p:spTree>
+    <p:extLst>
+      <p:ext uri="{BB962C8B-B14F-4D97-AF65-F5344CB8AC3E}">
+        <p14:creationId xmlns:p14="http://schemas.microsoft.com/office/powerpoint/2010/main" val="2735949051"/>
+      </p:ext>
+    </p:extLst>
+  </p:cSld>
+  <p:clrMapOvr>
+    <a:masterClrMapping/>
+  </p:clrMapOvr>
+</p:sld>
+</file>
+
+<file path=ppt/slides/slide14.xml><?xml version="1.0" encoding="utf-8"?>
+<p:sld xmlns:a="http://schemas.openxmlformats.org/drawingml/2006/main" xmlns:r="http://schemas.openxmlformats.org/officeDocument/2006/relationships" xmlns:p="http://schemas.openxmlformats.org/presentationml/2006/main">
+  <p:cSld>
+    <p:spTree>
+      <p:nvGrpSpPr>
+        <p:cNvPr id="1" name="">
+          <a:extLst>
+            <a:ext uri="{FF2B5EF4-FFF2-40B4-BE49-F238E27FC236}">
+              <a16:creationId xmlns:a16="http://schemas.microsoft.com/office/drawing/2014/main" id="{868C276A-180B-066F-EF08-4D124E26C665}"/>
+            </a:ext>
+          </a:extLst>
+        </p:cNvPr>
+        <p:cNvGrpSpPr/>
+        <p:nvPr/>
+      </p:nvGrpSpPr>
+      <p:grpSpPr>
+        <a:xfrm>
+          <a:off x="0" y="0"/>
+          <a:ext cx="0" cy="0"/>
+          <a:chOff x="0" y="0"/>
+          <a:chExt cx="0" cy="0"/>
+        </a:xfrm>
+      </p:grpSpPr>
+      <p:sp>
+        <p:nvSpPr>
+          <p:cNvPr id="2" name="Title 1">
+            <a:extLst>
+              <a:ext uri="{FF2B5EF4-FFF2-40B4-BE49-F238E27FC236}">
+                <a16:creationId xmlns:a16="http://schemas.microsoft.com/office/drawing/2014/main" id="{8C8FE067-BF29-1B27-F179-657A7994CF6D}"/>
+              </a:ext>
+            </a:extLst>
+          </p:cNvPr>
+          <p:cNvSpPr>
+            <a:spLocks noGrp="1"/>
+          </p:cNvSpPr>
+          <p:nvPr>
+            <p:ph type="title"/>
+          </p:nvPr>
+        </p:nvSpPr>
+        <p:spPr/>
+        <p:txBody>
+          <a:bodyPr/>
+          <a:lstStyle/>
+          <a:p>
+            <a:r>
+              <a:rPr lang="en-US" dirty="0" err="1"/>
+              <a:t>ConvNeXt</a:t>
+            </a:r>
+            <a:r>
+              <a:rPr lang="en-US" dirty="0"/>
+              <a:t> Histograms</a:t>
+            </a:r>
+          </a:p>
+        </p:txBody>
+      </p:sp>
+      <p:sp>
+        <p:nvSpPr>
+          <p:cNvPr id="4" name="TextBox 3">
+            <a:extLst>
+              <a:ext uri="{FF2B5EF4-FFF2-40B4-BE49-F238E27FC236}">
+                <a16:creationId xmlns:a16="http://schemas.microsoft.com/office/drawing/2014/main" id="{6AFC8FBA-BD76-90B6-750C-03D9EFC3ED24}"/>
+              </a:ext>
+            </a:extLst>
+          </p:cNvPr>
+          <p:cNvSpPr txBox="1"/>
+          <p:nvPr/>
+        </p:nvSpPr>
+        <p:spPr>
+          <a:xfrm>
+            <a:off x="1412959" y="5914711"/>
+            <a:ext cx="3788229" cy="369332"/>
+          </a:xfrm>
+          <a:prstGeom prst="rect">
+            <a:avLst/>
+          </a:prstGeom>
+          <a:noFill/>
+        </p:spPr>
+        <p:txBody>
+          <a:bodyPr wrap="square" rtlCol="0">
+            <a:spAutoFit/>
+          </a:bodyPr>
+          <a:lstStyle/>
+          <a:p>
+            <a:pPr algn="ctr"/>
+            <a:r>
+              <a:rPr lang="en-US" dirty="0"/>
+              <a:t>0 vs 0</a:t>
+            </a:r>
+          </a:p>
+        </p:txBody>
+      </p:sp>
+      <p:sp>
+        <p:nvSpPr>
+          <p:cNvPr id="6" name="TextBox 5">
+            <a:extLst>
+              <a:ext uri="{FF2B5EF4-FFF2-40B4-BE49-F238E27FC236}">
+                <a16:creationId xmlns:a16="http://schemas.microsoft.com/office/drawing/2014/main" id="{134F688E-B6C5-EDE5-092D-74AA366AD929}"/>
+              </a:ext>
+            </a:extLst>
+          </p:cNvPr>
+          <p:cNvSpPr txBox="1"/>
+          <p:nvPr/>
+        </p:nvSpPr>
+        <p:spPr>
+          <a:xfrm>
+            <a:off x="6990814" y="5914711"/>
+            <a:ext cx="3788229" cy="369332"/>
+          </a:xfrm>
+          <a:prstGeom prst="rect">
+            <a:avLst/>
+          </a:prstGeom>
+          <a:noFill/>
+        </p:spPr>
+        <p:txBody>
+          <a:bodyPr wrap="square" rtlCol="0">
+            <a:spAutoFit/>
+          </a:bodyPr>
+          <a:lstStyle/>
+          <a:p>
+            <a:pPr algn="ctr"/>
+            <a:r>
+              <a:rPr lang="en-US" dirty="0"/>
+              <a:t>50 vs 0</a:t>
+            </a:r>
+          </a:p>
+        </p:txBody>
+      </p:sp>
+      <p:pic>
+        <p:nvPicPr>
+          <p:cNvPr id="9" name="Picture 8" descr="A graph of a graph of a distance&#10;&#10;AI-generated content may be incorrect.">
+            <a:extLst>
+              <a:ext uri="{FF2B5EF4-FFF2-40B4-BE49-F238E27FC236}">
+                <a16:creationId xmlns:a16="http://schemas.microsoft.com/office/drawing/2014/main" id="{09B7932F-BC9A-0494-5854-CBC7379F3EC9}"/>
+              </a:ext>
+            </a:extLst>
+          </p:cNvPr>
+          <p:cNvPicPr>
+            <a:picLocks noChangeAspect="1"/>
+          </p:cNvPicPr>
+          <p:nvPr/>
+        </p:nvPicPr>
+        <p:blipFill>
+          <a:blip r:embed="rId2">
+            <a:extLst>
+              <a:ext uri="{28A0092B-C50C-407E-A947-70E740481C1C}">
+                <a14:useLocalDpi xmlns:a14="http://schemas.microsoft.com/office/drawing/2010/main" val="0"/>
+              </a:ext>
+            </a:extLst>
+          </a:blip>
+          <a:stretch>
+            <a:fillRect/>
+          </a:stretch>
+        </p:blipFill>
+        <p:spPr>
+          <a:xfrm>
+            <a:off x="518147" y="1714496"/>
+            <a:ext cx="5577851" cy="4114808"/>
+          </a:xfrm>
+          <a:prstGeom prst="rect">
+            <a:avLst/>
+          </a:prstGeom>
+        </p:spPr>
+      </p:pic>
+      <p:pic>
+        <p:nvPicPr>
+          <p:cNvPr id="11" name="Picture 10" descr="A graph of a number of people&#10;&#10;AI-generated content may be incorrect.">
+            <a:extLst>
+              <a:ext uri="{FF2B5EF4-FFF2-40B4-BE49-F238E27FC236}">
+                <a16:creationId xmlns:a16="http://schemas.microsoft.com/office/drawing/2014/main" id="{55BE34CE-B57A-B26A-0B31-5934372A4CD2}"/>
+              </a:ext>
+            </a:extLst>
+          </p:cNvPr>
+          <p:cNvPicPr>
+            <a:picLocks noChangeAspect="1"/>
+          </p:cNvPicPr>
+          <p:nvPr/>
+        </p:nvPicPr>
+        <p:blipFill>
+          <a:blip r:embed="rId3">
+            <a:extLst>
+              <a:ext uri="{28A0092B-C50C-407E-A947-70E740481C1C}">
+                <a14:useLocalDpi xmlns:a14="http://schemas.microsoft.com/office/drawing/2010/main" val="0"/>
+              </a:ext>
+            </a:extLst>
+          </a:blip>
+          <a:stretch>
+            <a:fillRect/>
+          </a:stretch>
+        </p:blipFill>
+        <p:spPr>
+          <a:xfrm>
+            <a:off x="6095998" y="1714496"/>
+            <a:ext cx="5577851" cy="4114808"/>
+          </a:xfrm>
+          <a:prstGeom prst="rect">
+            <a:avLst/>
+          </a:prstGeom>
+        </p:spPr>
+      </p:pic>
+    </p:spTree>
+    <p:extLst>
+      <p:ext uri="{BB962C8B-B14F-4D97-AF65-F5344CB8AC3E}">
+        <p14:creationId xmlns:p14="http://schemas.microsoft.com/office/powerpoint/2010/main" val="2894264962"/>
+      </p:ext>
+    </p:extLst>
+  </p:cSld>
+  <p:clrMapOvr>
+    <a:masterClrMapping/>
+  </p:clrMapOvr>
+</p:sld>
+</file>
+
+<file path=ppt/slides/slide15.xml><?xml version="1.0" encoding="utf-8"?>
+<p:sld xmlns:a="http://schemas.openxmlformats.org/drawingml/2006/main" xmlns:r="http://schemas.openxmlformats.org/officeDocument/2006/relationships" xmlns:p="http://schemas.openxmlformats.org/presentationml/2006/main">
+  <p:cSld>
+    <p:spTree>
+      <p:nvGrpSpPr>
+        <p:cNvPr id="1" name="">
+          <a:extLst>
+            <a:ext uri="{FF2B5EF4-FFF2-40B4-BE49-F238E27FC236}">
+              <a16:creationId xmlns:a16="http://schemas.microsoft.com/office/drawing/2014/main" id="{3970EBEF-F8A8-2C8A-8998-188132A3C763}"/>
+            </a:ext>
+          </a:extLst>
+        </p:cNvPr>
+        <p:cNvGrpSpPr/>
+        <p:nvPr/>
+      </p:nvGrpSpPr>
+      <p:grpSpPr>
+        <a:xfrm>
+          <a:off x="0" y="0"/>
+          <a:ext cx="0" cy="0"/>
+          <a:chOff x="0" y="0"/>
+          <a:chExt cx="0" cy="0"/>
+        </a:xfrm>
+      </p:grpSpPr>
+      <p:sp>
+        <p:nvSpPr>
+          <p:cNvPr id="2" name="Title 1">
+            <a:extLst>
+              <a:ext uri="{FF2B5EF4-FFF2-40B4-BE49-F238E27FC236}">
+                <a16:creationId xmlns:a16="http://schemas.microsoft.com/office/drawing/2014/main" id="{08A031E3-24A7-E80C-DF56-4ECC9B9FCF1D}"/>
+              </a:ext>
+            </a:extLst>
+          </p:cNvPr>
+          <p:cNvSpPr>
+            <a:spLocks noGrp="1"/>
+          </p:cNvSpPr>
+          <p:nvPr>
+            <p:ph type="title"/>
+          </p:nvPr>
+        </p:nvSpPr>
+        <p:spPr/>
+        <p:txBody>
+          <a:bodyPr/>
+          <a:lstStyle/>
+          <a:p>
+            <a:r>
+              <a:rPr lang="en-US" dirty="0"/>
+              <a:t>Angle Correction + </a:t>
+            </a:r>
+            <a:r>
+              <a:rPr lang="en-US" dirty="0" err="1"/>
+              <a:t>ConvNeXt</a:t>
+            </a:r>
+            <a:r>
+              <a:rPr lang="en-US" dirty="0"/>
+              <a:t> Histograms</a:t>
+            </a:r>
+          </a:p>
+        </p:txBody>
+      </p:sp>
+      <p:sp>
+        <p:nvSpPr>
+          <p:cNvPr id="4" name="TextBox 3">
+            <a:extLst>
+              <a:ext uri="{FF2B5EF4-FFF2-40B4-BE49-F238E27FC236}">
+                <a16:creationId xmlns:a16="http://schemas.microsoft.com/office/drawing/2014/main" id="{29A23102-E4BA-6258-54B0-EC3B33A8543E}"/>
+              </a:ext>
+            </a:extLst>
+          </p:cNvPr>
+          <p:cNvSpPr txBox="1"/>
+          <p:nvPr/>
+        </p:nvSpPr>
+        <p:spPr>
+          <a:xfrm>
+            <a:off x="1412959" y="5914711"/>
+            <a:ext cx="3788229" cy="369332"/>
+          </a:xfrm>
+          <a:prstGeom prst="rect">
+            <a:avLst/>
+          </a:prstGeom>
+          <a:noFill/>
+        </p:spPr>
+        <p:txBody>
+          <a:bodyPr wrap="square" rtlCol="0">
+            <a:spAutoFit/>
+          </a:bodyPr>
+          <a:lstStyle/>
+          <a:p>
+            <a:pPr algn="ctr"/>
+            <a:r>
+              <a:rPr lang="en-US" dirty="0"/>
+              <a:t>0 vs 0</a:t>
+            </a:r>
+          </a:p>
+        </p:txBody>
+      </p:sp>
+      <p:sp>
+        <p:nvSpPr>
+          <p:cNvPr id="6" name="TextBox 5">
+            <a:extLst>
+              <a:ext uri="{FF2B5EF4-FFF2-40B4-BE49-F238E27FC236}">
+                <a16:creationId xmlns:a16="http://schemas.microsoft.com/office/drawing/2014/main" id="{1CDB8F24-86AE-81FF-79D4-A7F575159000}"/>
+              </a:ext>
+            </a:extLst>
+          </p:cNvPr>
+          <p:cNvSpPr txBox="1"/>
+          <p:nvPr/>
+        </p:nvSpPr>
+        <p:spPr>
+          <a:xfrm>
+            <a:off x="6990814" y="5914711"/>
+            <a:ext cx="3788229" cy="369332"/>
+          </a:xfrm>
+          <a:prstGeom prst="rect">
+            <a:avLst/>
+          </a:prstGeom>
+          <a:noFill/>
+        </p:spPr>
+        <p:txBody>
+          <a:bodyPr wrap="square" rtlCol="0">
+            <a:spAutoFit/>
+          </a:bodyPr>
+          <a:lstStyle/>
+          <a:p>
+            <a:pPr algn="ctr"/>
+            <a:r>
+              <a:rPr lang="en-US" dirty="0"/>
+              <a:t>50 vs 0</a:t>
+            </a:r>
+          </a:p>
+        </p:txBody>
+      </p:sp>
+      <p:pic>
+        <p:nvPicPr>
+          <p:cNvPr id="7" name="Picture 6" descr="A graph of a number of people&#10;&#10;AI-generated content may be incorrect.">
+            <a:extLst>
+              <a:ext uri="{FF2B5EF4-FFF2-40B4-BE49-F238E27FC236}">
+                <a16:creationId xmlns:a16="http://schemas.microsoft.com/office/drawing/2014/main" id="{EF332DD5-C2D5-0D0C-AB53-12CB7B46089B}"/>
+              </a:ext>
+            </a:extLst>
+          </p:cNvPr>
+          <p:cNvPicPr>
+            <a:picLocks noChangeAspect="1"/>
+          </p:cNvPicPr>
+          <p:nvPr/>
+        </p:nvPicPr>
+        <p:blipFill>
+          <a:blip r:embed="rId2">
+            <a:extLst>
+              <a:ext uri="{28A0092B-C50C-407E-A947-70E740481C1C}">
+                <a14:useLocalDpi xmlns:a14="http://schemas.microsoft.com/office/drawing/2010/main" val="0"/>
+              </a:ext>
+            </a:extLst>
+          </a:blip>
+          <a:stretch>
+            <a:fillRect/>
+          </a:stretch>
+        </p:blipFill>
+        <p:spPr>
+          <a:xfrm>
+            <a:off x="518147" y="1714496"/>
+            <a:ext cx="5577851" cy="4114808"/>
+          </a:xfrm>
+          <a:prstGeom prst="rect">
+            <a:avLst/>
+          </a:prstGeom>
+        </p:spPr>
+      </p:pic>
+      <p:pic>
+        <p:nvPicPr>
+          <p:cNvPr id="11" name="Picture 10" descr="A graph of a number of people&#10;&#10;AI-generated content may be incorrect.">
+            <a:extLst>
+              <a:ext uri="{FF2B5EF4-FFF2-40B4-BE49-F238E27FC236}">
+                <a16:creationId xmlns:a16="http://schemas.microsoft.com/office/drawing/2014/main" id="{B6416C58-41C8-7AC9-C0E4-601D6B899572}"/>
+              </a:ext>
+            </a:extLst>
+          </p:cNvPr>
+          <p:cNvPicPr>
+            <a:picLocks noChangeAspect="1"/>
+          </p:cNvPicPr>
+          <p:nvPr/>
+        </p:nvPicPr>
+        <p:blipFill>
+          <a:blip r:embed="rId3">
+            <a:extLst>
+              <a:ext uri="{28A0092B-C50C-407E-A947-70E740481C1C}">
+                <a14:useLocalDpi xmlns:a14="http://schemas.microsoft.com/office/drawing/2010/main" val="0"/>
+              </a:ext>
+            </a:extLst>
+          </a:blip>
+          <a:stretch>
+            <a:fillRect/>
+          </a:stretch>
+        </p:blipFill>
+        <p:spPr>
+          <a:xfrm>
+            <a:off x="6096002" y="1714496"/>
+            <a:ext cx="5577851" cy="4114808"/>
+          </a:xfrm>
+          <a:prstGeom prst="rect">
+            <a:avLst/>
+          </a:prstGeom>
+        </p:spPr>
+      </p:pic>
+    </p:spTree>
+    <p:extLst>
+      <p:ext uri="{BB962C8B-B14F-4D97-AF65-F5344CB8AC3E}">
+        <p14:creationId xmlns:p14="http://schemas.microsoft.com/office/powerpoint/2010/main" val="3379585343"/>
+      </p:ext>
+    </p:extLst>
+  </p:cSld>
+  <p:clrMapOvr>
+    <a:masterClrMapping/>
+  </p:clrMapOvr>
+</p:sld>
+</file>
+
+<file path=ppt/slides/slide16.xml><?xml version="1.0" encoding="utf-8"?>
+<p:sld xmlns:a="http://schemas.openxmlformats.org/drawingml/2006/main" xmlns:r="http://schemas.openxmlformats.org/officeDocument/2006/relationships" xmlns:p="http://schemas.openxmlformats.org/presentationml/2006/main">
+  <p:cSld>
+    <p:spTree>
+      <p:nvGrpSpPr>
+        <p:cNvPr id="1" name=""/>
+        <p:cNvGrpSpPr/>
+        <p:nvPr/>
+      </p:nvGrpSpPr>
+      <p:grpSpPr>
+        <a:xfrm>
+          <a:off x="0" y="0"/>
+          <a:ext cx="0" cy="0"/>
+          <a:chOff x="0" y="0"/>
+          <a:chExt cx="0" cy="0"/>
+        </a:xfrm>
+      </p:grpSpPr>
+      <p:sp>
+        <p:nvSpPr>
+          <p:cNvPr id="2" name="Title 1">
+            <a:extLst>
+              <a:ext uri="{FF2B5EF4-FFF2-40B4-BE49-F238E27FC236}">
+                <a16:creationId xmlns:a16="http://schemas.microsoft.com/office/drawing/2014/main" id="{ED14E2A7-6849-A0E9-2453-A06074C0A063}"/>
+              </a:ext>
+            </a:extLst>
+          </p:cNvPr>
+          <p:cNvSpPr>
+            <a:spLocks noGrp="1"/>
+          </p:cNvSpPr>
+          <p:nvPr>
+            <p:ph type="title"/>
+          </p:nvPr>
+        </p:nvSpPr>
+        <p:spPr/>
+        <p:txBody>
+          <a:bodyPr/>
+          <a:lstStyle/>
+          <a:p>
+            <a:r>
+              <a:rPr lang="en-US" dirty="0"/>
+              <a:t>Discussion</a:t>
+            </a:r>
+          </a:p>
+        </p:txBody>
+      </p:sp>
+      <p:sp>
+        <p:nvSpPr>
+          <p:cNvPr id="3" name="Content Placeholder 2">
+            <a:extLst>
+              <a:ext uri="{FF2B5EF4-FFF2-40B4-BE49-F238E27FC236}">
+                <a16:creationId xmlns:a16="http://schemas.microsoft.com/office/drawing/2014/main" id="{5C614957-1B20-0374-8484-B04EBDDDE928}"/>
+              </a:ext>
+            </a:extLst>
+          </p:cNvPr>
+          <p:cNvSpPr>
+            <a:spLocks noGrp="1"/>
+          </p:cNvSpPr>
+          <p:nvPr>
+            <p:ph idx="1"/>
+          </p:nvPr>
+        </p:nvSpPr>
+        <p:spPr/>
+        <p:txBody>
+          <a:bodyPr/>
+          <a:lstStyle/>
+          <a:p>
+            <a:r>
+              <a:rPr lang="en-US" dirty="0"/>
+              <a:t>Transformed images worse for </a:t>
+            </a:r>
+            <a:r>
+              <a:rPr lang="en-US" dirty="0" err="1"/>
+              <a:t>ConvNeXt</a:t>
+            </a:r>
+            <a:endParaRPr lang="en-US" dirty="0"/>
+          </a:p>
+          <a:p>
+            <a:r>
+              <a:rPr lang="en-US" dirty="0" err="1"/>
+              <a:t>ConvNeXt</a:t>
+            </a:r>
+            <a:r>
+              <a:rPr lang="en-US" dirty="0"/>
+              <a:t> learns set of filters for different angles</a:t>
+            </a:r>
+          </a:p>
+          <a:p>
+            <a:r>
+              <a:rPr lang="en-US" dirty="0"/>
+              <a:t>All angles looking same makes it difficult for model to differentiate angles.</a:t>
+            </a:r>
+          </a:p>
+        </p:txBody>
+      </p:sp>
+    </p:spTree>
+    <p:extLst>
+      <p:ext uri="{BB962C8B-B14F-4D97-AF65-F5344CB8AC3E}">
+        <p14:creationId xmlns:p14="http://schemas.microsoft.com/office/powerpoint/2010/main" val="3373347486"/>
+      </p:ext>
+    </p:extLst>
+  </p:cSld>
+  <p:clrMapOvr>
+    <a:masterClrMapping/>
+  </p:clrMapOvr>
+</p:sld>
+</file>
+
 <file path=ppt/slides/slide2.xml><?xml version="1.0" encoding="utf-8"?>
 <p:sld xmlns:a="http://schemas.openxmlformats.org/drawingml/2006/main" xmlns:r="http://schemas.openxmlformats.org/officeDocument/2006/relationships" xmlns:p="http://schemas.openxmlformats.org/presentationml/2006/main">
   <p:cSld>
@@ -4612,6 +5940,198 @@
     <p:extLst>
       <p:ext uri="{BB962C8B-B14F-4D97-AF65-F5344CB8AC3E}">
         <p14:creationId xmlns:p14="http://schemas.microsoft.com/office/powerpoint/2010/main" val="3937518327"/>
+      </p:ext>
+    </p:extLst>
+  </p:cSld>
+  <p:clrMapOvr>
+    <a:masterClrMapping/>
+  </p:clrMapOvr>
+</p:sld>
+</file>
+
+<file path=ppt/slides/slide8.xml><?xml version="1.0" encoding="utf-8"?>
+<p:sld xmlns:a="http://schemas.openxmlformats.org/drawingml/2006/main" xmlns:r="http://schemas.openxmlformats.org/officeDocument/2006/relationships" xmlns:p="http://schemas.openxmlformats.org/presentationml/2006/main">
+  <p:cSld>
+    <p:spTree>
+      <p:nvGrpSpPr>
+        <p:cNvPr id="1" name=""/>
+        <p:cNvGrpSpPr/>
+        <p:nvPr/>
+      </p:nvGrpSpPr>
+      <p:grpSpPr>
+        <a:xfrm>
+          <a:off x="0" y="0"/>
+          <a:ext cx="0" cy="0"/>
+          <a:chOff x="0" y="0"/>
+          <a:chExt cx="0" cy="0"/>
+        </a:xfrm>
+      </p:grpSpPr>
+      <p:sp>
+        <p:nvSpPr>
+          <p:cNvPr id="2" name="Title 1">
+            <a:extLst>
+              <a:ext uri="{FF2B5EF4-FFF2-40B4-BE49-F238E27FC236}">
+                <a16:creationId xmlns:a16="http://schemas.microsoft.com/office/drawing/2014/main" id="{5A8305BD-082A-4286-5A69-FFFAEB96BD9C}"/>
+              </a:ext>
+            </a:extLst>
+          </p:cNvPr>
+          <p:cNvSpPr>
+            <a:spLocks noGrp="1"/>
+          </p:cNvSpPr>
+          <p:nvPr>
+            <p:ph type="title"/>
+          </p:nvPr>
+        </p:nvSpPr>
+        <p:spPr/>
+        <p:txBody>
+          <a:bodyPr/>
+          <a:lstStyle/>
+          <a:p>
+            <a:r>
+              <a:rPr lang="en-US" dirty="0"/>
+              <a:t>Discussion</a:t>
+            </a:r>
+          </a:p>
+        </p:txBody>
+      </p:sp>
+      <p:sp>
+        <p:nvSpPr>
+          <p:cNvPr id="3" name="Content Placeholder 2">
+            <a:extLst>
+              <a:ext uri="{FF2B5EF4-FFF2-40B4-BE49-F238E27FC236}">
+                <a16:creationId xmlns:a16="http://schemas.microsoft.com/office/drawing/2014/main" id="{37EBC72B-DE54-6C06-E665-DE908E74C54B}"/>
+              </a:ext>
+            </a:extLst>
+          </p:cNvPr>
+          <p:cNvSpPr>
+            <a:spLocks noGrp="1"/>
+          </p:cNvSpPr>
+          <p:nvPr>
+            <p:ph idx="1"/>
+          </p:nvPr>
+        </p:nvSpPr>
+        <p:spPr/>
+        <p:txBody>
+          <a:bodyPr/>
+          <a:lstStyle/>
+          <a:p>
+            <a:r>
+              <a:rPr lang="en-US" dirty="0"/>
+              <a:t>STN Worse than base </a:t>
+            </a:r>
+            <a:r>
+              <a:rPr lang="en-US" dirty="0" err="1"/>
+              <a:t>ConvNeXt</a:t>
+            </a:r>
+            <a:endParaRPr lang="en-US" dirty="0"/>
+          </a:p>
+          <a:p>
+            <a:r>
+              <a:rPr lang="en-US" dirty="0"/>
+              <a:t>Inconsistent transformations -&gt; </a:t>
+            </a:r>
+            <a:r>
+              <a:rPr lang="en-US" dirty="0" err="1"/>
+              <a:t>ConvNeXt</a:t>
+            </a:r>
+            <a:r>
+              <a:rPr lang="en-US" dirty="0"/>
+              <a:t> instability</a:t>
+            </a:r>
+          </a:p>
+          <a:p>
+            <a:r>
+              <a:rPr lang="en-US" dirty="0"/>
+              <a:t>Transformations not useful to </a:t>
+            </a:r>
+            <a:r>
+              <a:rPr lang="en-US" dirty="0" err="1"/>
+              <a:t>ConvNeXt</a:t>
+            </a:r>
+            <a:endParaRPr lang="en-US" dirty="0"/>
+          </a:p>
+          <a:p>
+            <a:pPr lvl="1"/>
+            <a:r>
+              <a:rPr lang="en-US" dirty="0"/>
+              <a:t>Transformations fundamentally cannot add information to image</a:t>
+            </a:r>
+          </a:p>
+        </p:txBody>
+      </p:sp>
+    </p:spTree>
+    <p:extLst>
+      <p:ext uri="{BB962C8B-B14F-4D97-AF65-F5344CB8AC3E}">
+        <p14:creationId xmlns:p14="http://schemas.microsoft.com/office/powerpoint/2010/main" val="3927145494"/>
+      </p:ext>
+    </p:extLst>
+  </p:cSld>
+  <p:clrMapOvr>
+    <a:masterClrMapping/>
+  </p:clrMapOvr>
+</p:sld>
+</file>
+
+<file path=ppt/slides/slide9.xml><?xml version="1.0" encoding="utf-8"?>
+<p:sld xmlns:a="http://schemas.openxmlformats.org/drawingml/2006/main" xmlns:r="http://schemas.openxmlformats.org/officeDocument/2006/relationships" xmlns:p="http://schemas.openxmlformats.org/presentationml/2006/main">
+  <p:cSld>
+    <p:spTree>
+      <p:nvGrpSpPr>
+        <p:cNvPr id="1" name="">
+          <a:extLst>
+            <a:ext uri="{FF2B5EF4-FFF2-40B4-BE49-F238E27FC236}">
+              <a16:creationId xmlns:a16="http://schemas.microsoft.com/office/drawing/2014/main" id="{F17C8A82-46EC-8EA9-4E41-D39D893FEFD3}"/>
+            </a:ext>
+          </a:extLst>
+        </p:cNvPr>
+        <p:cNvGrpSpPr/>
+        <p:nvPr/>
+      </p:nvGrpSpPr>
+      <p:grpSpPr>
+        <a:xfrm>
+          <a:off x="0" y="0"/>
+          <a:ext cx="0" cy="0"/>
+          <a:chOff x="0" y="0"/>
+          <a:chExt cx="0" cy="0"/>
+        </a:xfrm>
+      </p:grpSpPr>
+      <p:sp>
+        <p:nvSpPr>
+          <p:cNvPr id="2" name="Title 1">
+            <a:extLst>
+              <a:ext uri="{FF2B5EF4-FFF2-40B4-BE49-F238E27FC236}">
+                <a16:creationId xmlns:a16="http://schemas.microsoft.com/office/drawing/2014/main" id="{7B1ECC91-F4E5-6FC4-E786-C0B5E979F462}"/>
+              </a:ext>
+            </a:extLst>
+          </p:cNvPr>
+          <p:cNvSpPr>
+            <a:spLocks noGrp="1"/>
+          </p:cNvSpPr>
+          <p:nvPr>
+            <p:ph type="ctrTitle"/>
+          </p:nvPr>
+        </p:nvSpPr>
+        <p:spPr/>
+        <p:txBody>
+          <a:bodyPr/>
+          <a:lstStyle/>
+          <a:p>
+            <a:r>
+              <a:rPr lang="en-US" dirty="0"/>
+              <a:t>Angle Correction + </a:t>
+            </a:r>
+            <a:r>
+              <a:rPr lang="en-US" dirty="0" err="1"/>
+              <a:t>ConvNeXt</a:t>
+            </a:r>
+            <a:endParaRPr lang="en-US" dirty="0"/>
+          </a:p>
+        </p:txBody>
+      </p:sp>
+    </p:spTree>
+    <p:extLst>
+      <p:ext uri="{BB962C8B-B14F-4D97-AF65-F5344CB8AC3E}">
+        <p14:creationId xmlns:p14="http://schemas.microsoft.com/office/powerpoint/2010/main" val="720848152"/>
       </p:ext>
     </p:extLst>
   </p:cSld>

</xml_diff>